<commit_message>
Création de PageTemplate Intégration des views Intégration des routes Création d'un fichier de configuration : config.conf
</commit_message>
<xml_diff>
--- a/docs/Schéma-blog.pptx
+++ b/docs/Schéma-blog.pptx
@@ -7,13 +7,13 @@
   <p:sldIdLst>
     <p:sldId id="256" r:id="rId2"/>
     <p:sldId id="257" r:id="rId3"/>
-    <p:sldId id="270" r:id="rId4"/>
-    <p:sldId id="258" r:id="rId5"/>
-    <p:sldId id="268" r:id="rId6"/>
-    <p:sldId id="259" r:id="rId7"/>
-    <p:sldId id="260" r:id="rId8"/>
-    <p:sldId id="263" r:id="rId9"/>
-    <p:sldId id="267" r:id="rId10"/>
+    <p:sldId id="271" r:id="rId4"/>
+    <p:sldId id="270" r:id="rId5"/>
+    <p:sldId id="258" r:id="rId6"/>
+    <p:sldId id="268" r:id="rId7"/>
+    <p:sldId id="259" r:id="rId8"/>
+    <p:sldId id="260" r:id="rId9"/>
+    <p:sldId id="263" r:id="rId10"/>
     <p:sldId id="266" r:id="rId11"/>
     <p:sldId id="265" r:id="rId12"/>
   </p:sldIdLst>
@@ -253,7 +253,7 @@
           <a:p>
             <a:fld id="{15FC16A5-DD39-458B-B2FE-39F268B0EE39}" type="datetimeFigureOut">
               <a:rPr lang="fr-FR" smtClean="0"/>
-              <a:t>13/06/2018</a:t>
+              <a:t>18/06/2018</a:t>
             </a:fld>
             <a:endParaRPr lang="fr-FR"/>
           </a:p>
@@ -423,7 +423,7 @@
           <a:p>
             <a:fld id="{15FC16A5-DD39-458B-B2FE-39F268B0EE39}" type="datetimeFigureOut">
               <a:rPr lang="fr-FR" smtClean="0"/>
-              <a:t>13/06/2018</a:t>
+              <a:t>18/06/2018</a:t>
             </a:fld>
             <a:endParaRPr lang="fr-FR"/>
           </a:p>
@@ -603,7 +603,7 @@
           <a:p>
             <a:fld id="{15FC16A5-DD39-458B-B2FE-39F268B0EE39}" type="datetimeFigureOut">
               <a:rPr lang="fr-FR" smtClean="0"/>
-              <a:t>13/06/2018</a:t>
+              <a:t>18/06/2018</a:t>
             </a:fld>
             <a:endParaRPr lang="fr-FR"/>
           </a:p>
@@ -773,7 +773,7 @@
           <a:p>
             <a:fld id="{15FC16A5-DD39-458B-B2FE-39F268B0EE39}" type="datetimeFigureOut">
               <a:rPr lang="fr-FR" smtClean="0"/>
-              <a:t>13/06/2018</a:t>
+              <a:t>18/06/2018</a:t>
             </a:fld>
             <a:endParaRPr lang="fr-FR"/>
           </a:p>
@@ -1019,7 +1019,7 @@
           <a:p>
             <a:fld id="{15FC16A5-DD39-458B-B2FE-39F268B0EE39}" type="datetimeFigureOut">
               <a:rPr lang="fr-FR" smtClean="0"/>
-              <a:t>13/06/2018</a:t>
+              <a:t>18/06/2018</a:t>
             </a:fld>
             <a:endParaRPr lang="fr-FR"/>
           </a:p>
@@ -1251,7 +1251,7 @@
           <a:p>
             <a:fld id="{15FC16A5-DD39-458B-B2FE-39F268B0EE39}" type="datetimeFigureOut">
               <a:rPr lang="fr-FR" smtClean="0"/>
-              <a:t>13/06/2018</a:t>
+              <a:t>18/06/2018</a:t>
             </a:fld>
             <a:endParaRPr lang="fr-FR"/>
           </a:p>
@@ -1618,7 +1618,7 @@
           <a:p>
             <a:fld id="{15FC16A5-DD39-458B-B2FE-39F268B0EE39}" type="datetimeFigureOut">
               <a:rPr lang="fr-FR" smtClean="0"/>
-              <a:t>13/06/2018</a:t>
+              <a:t>18/06/2018</a:t>
             </a:fld>
             <a:endParaRPr lang="fr-FR"/>
           </a:p>
@@ -1736,7 +1736,7 @@
           <a:p>
             <a:fld id="{15FC16A5-DD39-458B-B2FE-39F268B0EE39}" type="datetimeFigureOut">
               <a:rPr lang="fr-FR" smtClean="0"/>
-              <a:t>13/06/2018</a:t>
+              <a:t>18/06/2018</a:t>
             </a:fld>
             <a:endParaRPr lang="fr-FR"/>
           </a:p>
@@ -1831,7 +1831,7 @@
           <a:p>
             <a:fld id="{15FC16A5-DD39-458B-B2FE-39F268B0EE39}" type="datetimeFigureOut">
               <a:rPr lang="fr-FR" smtClean="0"/>
-              <a:t>13/06/2018</a:t>
+              <a:t>18/06/2018</a:t>
             </a:fld>
             <a:endParaRPr lang="fr-FR"/>
           </a:p>
@@ -2108,7 +2108,7 @@
           <a:p>
             <a:fld id="{15FC16A5-DD39-458B-B2FE-39F268B0EE39}" type="datetimeFigureOut">
               <a:rPr lang="fr-FR" smtClean="0"/>
-              <a:t>13/06/2018</a:t>
+              <a:t>18/06/2018</a:t>
             </a:fld>
             <a:endParaRPr lang="fr-FR"/>
           </a:p>
@@ -2361,7 +2361,7 @@
           <a:p>
             <a:fld id="{15FC16A5-DD39-458B-B2FE-39F268B0EE39}" type="datetimeFigureOut">
               <a:rPr lang="fr-FR" smtClean="0"/>
-              <a:t>13/06/2018</a:t>
+              <a:t>18/06/2018</a:t>
             </a:fld>
             <a:endParaRPr lang="fr-FR"/>
           </a:p>
@@ -2574,7 +2574,7 @@
           <a:p>
             <a:fld id="{15FC16A5-DD39-458B-B2FE-39F268B0EE39}" type="datetimeFigureOut">
               <a:rPr lang="fr-FR" smtClean="0"/>
-              <a:t>13/06/2018</a:t>
+              <a:t>18/06/2018</a:t>
             </a:fld>
             <a:endParaRPr lang="fr-FR"/>
           </a:p>
@@ -4211,7 +4211,6 @@
               <a:rPr lang="fr-FR" sz="1200" dirty="0"/>
               <a:t>N</a:t>
             </a:r>
-            <a:endParaRPr lang="fr-FR" sz="1200" dirty="0"/>
           </a:p>
         </p:txBody>
       </p:sp>
@@ -4307,7 +4306,6 @@
               <a:rPr lang="fr-FR" sz="1200" dirty="0"/>
               <a:t>N</a:t>
             </a:r>
-            <a:endParaRPr lang="fr-FR" sz="1200" dirty="0"/>
           </a:p>
         </p:txBody>
       </p:sp>
@@ -4616,19 +4614,22 @@
             <p:ph type="title"/>
           </p:nvPr>
         </p:nvSpPr>
-        <p:spPr/>
-        <p:txBody>
-          <a:bodyPr/>
+        <p:spPr>
+          <a:xfrm>
+            <a:off x="838200" y="365125"/>
+            <a:ext cx="10234808" cy="585247"/>
+          </a:xfrm>
+        </p:spPr>
+        <p:txBody>
+          <a:bodyPr>
+            <a:normAutofit fontScale="90000"/>
+          </a:bodyPr>
           <a:lstStyle/>
           <a:p>
             <a:pPr algn="ctr"/>
             <a:r>
               <a:rPr lang="fr-FR" dirty="0" smtClean="0"/>
-              <a:t>Page d’accueil </a:t>
-            </a:r>
-            <a:r>
-              <a:rPr lang="fr-FR" dirty="0" smtClean="0"/>
-              <a:t>visiteur</a:t>
+              <a:t>Page d’accueil visiteur</a:t>
             </a:r>
             <a:endParaRPr lang="fr-FR" dirty="0"/>
           </a:p>
@@ -4682,8 +4683,8 @@
         </p:nvSpPr>
         <p:spPr>
           <a:xfrm>
-            <a:off x="4397432" y="1487978"/>
-            <a:ext cx="2951018" cy="640080"/>
+            <a:off x="3740727" y="2348679"/>
+            <a:ext cx="4239491" cy="541700"/>
           </a:xfrm>
           <a:prstGeom prst="rect">
             <a:avLst/>
@@ -4729,8 +4730,8 @@
         </p:nvSpPr>
         <p:spPr>
           <a:xfrm>
-            <a:off x="7481455" y="1487978"/>
-            <a:ext cx="1022463" cy="464875"/>
+            <a:off x="6384230" y="1485474"/>
+            <a:ext cx="1025880" cy="400042"/>
           </a:xfrm>
           <a:prstGeom prst="rect">
             <a:avLst/>
@@ -4762,11 +4763,7 @@
             <a:pPr algn="ctr"/>
             <a:r>
               <a:rPr lang="fr-FR" sz="1200" dirty="0" smtClean="0"/>
-              <a:t>Déc</a:t>
-            </a:r>
-            <a:r>
-              <a:rPr lang="fr-FR" sz="1200" dirty="0" smtClean="0"/>
-              <a:t>onnexion</a:t>
+              <a:t>Connexion</a:t>
             </a:r>
             <a:endParaRPr lang="fr-FR" sz="1200" dirty="0"/>
           </a:p>
@@ -4780,8 +4777,8 @@
         </p:nvSpPr>
         <p:spPr>
           <a:xfrm>
-            <a:off x="3740727" y="2644416"/>
-            <a:ext cx="4239491" cy="3176245"/>
+            <a:off x="3740728" y="3180007"/>
+            <a:ext cx="4251958" cy="2243764"/>
           </a:xfrm>
           <a:prstGeom prst="rect">
             <a:avLst/>
@@ -4823,8 +4820,8 @@
         </p:nvSpPr>
         <p:spPr>
           <a:xfrm>
-            <a:off x="3415839" y="1505087"/>
-            <a:ext cx="756458" cy="556953"/>
+            <a:off x="3415838" y="1505088"/>
+            <a:ext cx="1268895" cy="378574"/>
           </a:xfrm>
           <a:prstGeom prst="rect">
             <a:avLst/>
@@ -4854,7 +4851,11 @@
           <a:lstStyle/>
           <a:p>
             <a:pPr algn="ctr"/>
-            <a:endParaRPr lang="fr-FR"/>
+            <a:r>
+              <a:rPr lang="fr-FR" sz="1400" dirty="0" smtClean="0"/>
+              <a:t>Nom auteur</a:t>
+            </a:r>
+            <a:endParaRPr lang="fr-FR" sz="1400" dirty="0"/>
           </a:p>
         </p:txBody>
       </p:sp>
@@ -4866,8 +4867,8 @@
         </p:nvSpPr>
         <p:spPr>
           <a:xfrm>
-            <a:off x="3241962" y="6192013"/>
-            <a:ext cx="5378335" cy="494625"/>
+            <a:off x="3241962" y="5903427"/>
+            <a:ext cx="5378335" cy="783211"/>
           </a:xfrm>
           <a:prstGeom prst="rect">
             <a:avLst/>
@@ -4913,12 +4914,15 @@
         </p:nvSpPr>
         <p:spPr>
           <a:xfrm>
-            <a:off x="3765664" y="5645597"/>
+            <a:off x="5349239" y="5573595"/>
             <a:ext cx="1022466" cy="180008"/>
           </a:xfrm>
           <a:prstGeom prst="rect">
             <a:avLst/>
           </a:prstGeom>
+          <a:solidFill>
+            <a:schemeClr val="accent2"/>
+          </a:solidFill>
         </p:spPr>
         <p:style>
           <a:lnRef idx="2">
@@ -4957,7 +4961,7 @@
         </p:nvSpPr>
         <p:spPr>
           <a:xfrm>
-            <a:off x="4551217" y="2829540"/>
+            <a:off x="4563684" y="3167753"/>
             <a:ext cx="2618510" cy="369332"/>
           </a:xfrm>
           <a:prstGeom prst="rect">
@@ -4977,6 +4981,173 @@
               <a:t>Index des billets</a:t>
             </a:r>
             <a:endParaRPr lang="fr-FR" dirty="0"/>
+          </a:p>
+        </p:txBody>
+      </p:sp>
+      <p:sp>
+        <p:nvSpPr>
+          <p:cNvPr id="14" name="Rectangle 13"/>
+          <p:cNvSpPr/>
+          <p:nvPr/>
+        </p:nvSpPr>
+        <p:spPr>
+          <a:xfrm>
+            <a:off x="3894511" y="3537085"/>
+            <a:ext cx="3956859" cy="432262"/>
+          </a:xfrm>
+          <a:prstGeom prst="rect">
+            <a:avLst/>
+          </a:prstGeom>
+        </p:spPr>
+        <p:style>
+          <a:lnRef idx="2">
+            <a:schemeClr val="accent1">
+              <a:shade val="50000"/>
+            </a:schemeClr>
+          </a:lnRef>
+          <a:fillRef idx="1">
+            <a:schemeClr val="accent1"/>
+          </a:fillRef>
+          <a:effectRef idx="0">
+            <a:schemeClr val="accent1"/>
+          </a:effectRef>
+          <a:fontRef idx="minor">
+            <a:schemeClr val="lt1"/>
+          </a:fontRef>
+        </p:style>
+        <p:txBody>
+          <a:bodyPr rtlCol="0" anchor="ctr"/>
+          <a:lstStyle/>
+          <a:p>
+            <a:pPr algn="ctr"/>
+            <a:endParaRPr lang="fr-FR"/>
+          </a:p>
+        </p:txBody>
+      </p:sp>
+      <p:sp>
+        <p:nvSpPr>
+          <p:cNvPr id="18" name="Rectangle 17"/>
+          <p:cNvSpPr/>
+          <p:nvPr/>
+        </p:nvSpPr>
+        <p:spPr>
+          <a:xfrm>
+            <a:off x="3894511" y="4181833"/>
+            <a:ext cx="3956859" cy="432262"/>
+          </a:xfrm>
+          <a:prstGeom prst="rect">
+            <a:avLst/>
+          </a:prstGeom>
+        </p:spPr>
+        <p:style>
+          <a:lnRef idx="2">
+            <a:schemeClr val="accent1">
+              <a:shade val="50000"/>
+            </a:schemeClr>
+          </a:lnRef>
+          <a:fillRef idx="1">
+            <a:schemeClr val="accent1"/>
+          </a:fillRef>
+          <a:effectRef idx="0">
+            <a:schemeClr val="accent1"/>
+          </a:effectRef>
+          <a:fontRef idx="minor">
+            <a:schemeClr val="lt1"/>
+          </a:fontRef>
+        </p:style>
+        <p:txBody>
+          <a:bodyPr rtlCol="0" anchor="ctr"/>
+          <a:lstStyle/>
+          <a:p>
+            <a:pPr algn="ctr"/>
+            <a:endParaRPr lang="fr-FR"/>
+          </a:p>
+        </p:txBody>
+      </p:sp>
+      <p:sp>
+        <p:nvSpPr>
+          <p:cNvPr id="19" name="Rectangle 18"/>
+          <p:cNvSpPr/>
+          <p:nvPr/>
+        </p:nvSpPr>
+        <p:spPr>
+          <a:xfrm>
+            <a:off x="3919562" y="4844390"/>
+            <a:ext cx="3956859" cy="432262"/>
+          </a:xfrm>
+          <a:prstGeom prst="rect">
+            <a:avLst/>
+          </a:prstGeom>
+        </p:spPr>
+        <p:style>
+          <a:lnRef idx="2">
+            <a:schemeClr val="accent1">
+              <a:shade val="50000"/>
+            </a:schemeClr>
+          </a:lnRef>
+          <a:fillRef idx="1">
+            <a:schemeClr val="accent1"/>
+          </a:fillRef>
+          <a:effectRef idx="0">
+            <a:schemeClr val="accent1"/>
+          </a:effectRef>
+          <a:fontRef idx="minor">
+            <a:schemeClr val="lt1"/>
+          </a:fontRef>
+        </p:style>
+        <p:txBody>
+          <a:bodyPr rtlCol="0" anchor="ctr"/>
+          <a:lstStyle/>
+          <a:p>
+            <a:pPr algn="ctr"/>
+            <a:endParaRPr lang="fr-FR"/>
+          </a:p>
+        </p:txBody>
+      </p:sp>
+      <p:sp>
+        <p:nvSpPr>
+          <p:cNvPr id="20" name="Rectangle 19"/>
+          <p:cNvSpPr/>
+          <p:nvPr/>
+        </p:nvSpPr>
+        <p:spPr>
+          <a:xfrm>
+            <a:off x="7502264" y="1483619"/>
+            <a:ext cx="1025880" cy="400042"/>
+          </a:xfrm>
+          <a:prstGeom prst="rect">
+            <a:avLst/>
+          </a:prstGeom>
+          <a:solidFill>
+            <a:schemeClr val="accent2"/>
+          </a:solidFill>
+        </p:spPr>
+        <p:style>
+          <a:lnRef idx="2">
+            <a:schemeClr val="accent1">
+              <a:shade val="50000"/>
+            </a:schemeClr>
+          </a:lnRef>
+          <a:fillRef idx="1">
+            <a:schemeClr val="accent1"/>
+          </a:fillRef>
+          <a:effectRef idx="0">
+            <a:schemeClr val="accent1"/>
+          </a:effectRef>
+          <a:fontRef idx="minor">
+            <a:schemeClr val="lt1"/>
+          </a:fontRef>
+        </p:style>
+        <p:txBody>
+          <a:bodyPr rtlCol="0" anchor="ctr"/>
+          <a:lstStyle/>
+          <a:p>
+            <a:pPr algn="ctr"/>
+            <a:r>
+              <a:rPr lang="fr-FR" sz="1200" dirty="0" smtClean="0"/>
+              <a:t>Inscription</a:t>
+            </a:r>
+            <a:endParaRPr lang="fr-FR" sz="1200" dirty="0"/>
           </a:p>
         </p:txBody>
       </p:sp>
@@ -5019,7 +5190,7 @@
       </p:grpSpPr>
       <p:sp>
         <p:nvSpPr>
-          <p:cNvPr id="2" name="Titre 1"/>
+          <p:cNvPr id="4" name="Titre 3"/>
           <p:cNvSpPr>
             <a:spLocks noGrp="1"/>
           </p:cNvSpPr>
@@ -5027,19 +5198,26 @@
             <p:ph type="title"/>
           </p:nvPr>
         </p:nvSpPr>
-        <p:spPr/>
-        <p:txBody>
-          <a:bodyPr/>
+        <p:spPr>
+          <a:xfrm>
+            <a:off x="731303" y="165962"/>
+            <a:ext cx="10361964" cy="429273"/>
+          </a:xfrm>
+        </p:spPr>
+        <p:txBody>
+          <a:bodyPr>
+            <a:normAutofit fontScale="90000"/>
+          </a:bodyPr>
           <a:lstStyle/>
           <a:p>
             <a:pPr algn="ctr"/>
             <a:r>
               <a:rPr lang="fr-FR" dirty="0" smtClean="0"/>
-              <a:t>Page de lecture d’un </a:t>
+              <a:t>Page d’accueil </a:t>
             </a:r>
             <a:r>
               <a:rPr lang="fr-FR" dirty="0" smtClean="0"/>
-              <a:t>billet en général</a:t>
+              <a:t>admin</a:t>
             </a:r>
             <a:endParaRPr lang="fr-FR" dirty="0"/>
           </a:p>
@@ -5047,54 +5225,279 @@
       </p:sp>
       <p:sp>
         <p:nvSpPr>
+          <p:cNvPr id="9" name="Rectangle 8"/>
+          <p:cNvSpPr/>
+          <p:nvPr/>
+        </p:nvSpPr>
+        <p:spPr>
+          <a:xfrm>
+            <a:off x="3093929" y="843962"/>
+            <a:ext cx="5526369" cy="5842676"/>
+          </a:xfrm>
+          <a:prstGeom prst="rect">
+            <a:avLst/>
+          </a:prstGeom>
+        </p:spPr>
+        <p:style>
+          <a:lnRef idx="2">
+            <a:schemeClr val="accent1">
+              <a:shade val="50000"/>
+            </a:schemeClr>
+          </a:lnRef>
+          <a:fillRef idx="1">
+            <a:schemeClr val="accent1"/>
+          </a:fillRef>
+          <a:effectRef idx="0">
+            <a:schemeClr val="accent1"/>
+          </a:effectRef>
+          <a:fontRef idx="minor">
+            <a:schemeClr val="lt1"/>
+          </a:fontRef>
+        </p:style>
+        <p:txBody>
+          <a:bodyPr rtlCol="0" anchor="ctr"/>
+          <a:lstStyle/>
+          <a:p>
+            <a:pPr algn="ctr"/>
+            <a:endParaRPr lang="fr-FR"/>
+          </a:p>
+        </p:txBody>
+      </p:sp>
+      <p:sp>
+        <p:nvSpPr>
+          <p:cNvPr id="15" name="Rectangle 14"/>
+          <p:cNvSpPr/>
+          <p:nvPr/>
+        </p:nvSpPr>
+        <p:spPr>
+          <a:xfrm>
+            <a:off x="3241963" y="6300349"/>
+            <a:ext cx="5378334" cy="386289"/>
+          </a:xfrm>
+          <a:prstGeom prst="rect">
+            <a:avLst/>
+          </a:prstGeom>
+          <a:solidFill>
+            <a:schemeClr val="accent6"/>
+          </a:solidFill>
+        </p:spPr>
+        <p:style>
+          <a:lnRef idx="2">
+            <a:schemeClr val="accent1">
+              <a:shade val="50000"/>
+            </a:schemeClr>
+          </a:lnRef>
+          <a:fillRef idx="1">
+            <a:schemeClr val="accent1"/>
+          </a:fillRef>
+          <a:effectRef idx="0">
+            <a:schemeClr val="accent1"/>
+          </a:effectRef>
+          <a:fontRef idx="minor">
+            <a:schemeClr val="lt1"/>
+          </a:fontRef>
+        </p:style>
+        <p:txBody>
+          <a:bodyPr rtlCol="0" anchor="ctr"/>
+          <a:lstStyle/>
+          <a:p>
+            <a:pPr algn="ctr"/>
+            <a:r>
+              <a:rPr lang="fr-FR" dirty="0" smtClean="0"/>
+              <a:t>FOOTER</a:t>
+            </a:r>
+            <a:endParaRPr lang="fr-FR" dirty="0"/>
+          </a:p>
+        </p:txBody>
+      </p:sp>
+      <p:sp>
+        <p:nvSpPr>
+          <p:cNvPr id="2" name="Rectangle 1"/>
+          <p:cNvSpPr/>
+          <p:nvPr/>
+        </p:nvSpPr>
+        <p:spPr>
+          <a:xfrm>
+            <a:off x="3375049" y="1941533"/>
+            <a:ext cx="4929707" cy="4085579"/>
+          </a:xfrm>
+          <a:prstGeom prst="rect">
+            <a:avLst/>
+          </a:prstGeom>
+          <a:solidFill>
+            <a:schemeClr val="accent6"/>
+          </a:solidFill>
+        </p:spPr>
+        <p:style>
+          <a:lnRef idx="2">
+            <a:schemeClr val="accent1">
+              <a:shade val="50000"/>
+            </a:schemeClr>
+          </a:lnRef>
+          <a:fillRef idx="1">
+            <a:schemeClr val="accent1"/>
+          </a:fillRef>
+          <a:effectRef idx="0">
+            <a:schemeClr val="accent1"/>
+          </a:effectRef>
+          <a:fontRef idx="minor">
+            <a:schemeClr val="lt1"/>
+          </a:fontRef>
+        </p:style>
+        <p:txBody>
+          <a:bodyPr rtlCol="0" anchor="ctr"/>
+          <a:lstStyle/>
+          <a:p>
+            <a:pPr algn="ctr"/>
+            <a:endParaRPr lang="fr-FR" dirty="0"/>
+          </a:p>
+        </p:txBody>
+      </p:sp>
+      <p:sp>
+        <p:nvSpPr>
           <p:cNvPr id="3" name="Rectangle 2"/>
           <p:cNvSpPr/>
           <p:nvPr/>
         </p:nvSpPr>
         <p:spPr>
           <a:xfrm>
-            <a:off x="3291840" y="1396538"/>
-            <a:ext cx="4871258" cy="5403273"/>
-          </a:xfrm>
-          <a:prstGeom prst="rect">
-            <a:avLst/>
-          </a:prstGeom>
-        </p:spPr>
-        <p:style>
-          <a:lnRef idx="2">
-            <a:schemeClr val="accent1">
-              <a:shade val="50000"/>
-            </a:schemeClr>
-          </a:lnRef>
-          <a:fillRef idx="1">
-            <a:schemeClr val="accent1"/>
-          </a:fillRef>
-          <a:effectRef idx="0">
-            <a:schemeClr val="accent1"/>
-          </a:effectRef>
-          <a:fontRef idx="minor">
-            <a:schemeClr val="lt1"/>
-          </a:fontRef>
-        </p:style>
-        <p:txBody>
-          <a:bodyPr rtlCol="0" anchor="ctr"/>
-          <a:lstStyle/>
-          <a:p>
-            <a:pPr algn="ctr"/>
-            <a:endParaRPr lang="fr-FR"/>
-          </a:p>
-        </p:txBody>
-      </p:sp>
-      <p:sp>
-        <p:nvSpPr>
-          <p:cNvPr id="4" name="Rectangle 3"/>
-          <p:cNvSpPr/>
-          <p:nvPr/>
-        </p:nvSpPr>
-        <p:spPr>
-          <a:xfrm>
-            <a:off x="3749040" y="1978429"/>
-            <a:ext cx="4015047" cy="1446415"/>
+            <a:off x="3093929" y="843962"/>
+            <a:ext cx="5526368" cy="698170"/>
+          </a:xfrm>
+          <a:prstGeom prst="rect">
+            <a:avLst/>
+          </a:prstGeom>
+          <a:solidFill>
+            <a:schemeClr val="accent6"/>
+          </a:solidFill>
+        </p:spPr>
+        <p:style>
+          <a:lnRef idx="2">
+            <a:schemeClr val="accent1">
+              <a:shade val="50000"/>
+            </a:schemeClr>
+          </a:lnRef>
+          <a:fillRef idx="1">
+            <a:schemeClr val="accent1"/>
+          </a:fillRef>
+          <a:effectRef idx="0">
+            <a:schemeClr val="accent1"/>
+          </a:effectRef>
+          <a:fontRef idx="minor">
+            <a:schemeClr val="lt1"/>
+          </a:fontRef>
+        </p:style>
+        <p:txBody>
+          <a:bodyPr rtlCol="0" anchor="ctr"/>
+          <a:lstStyle/>
+          <a:p>
+            <a:pPr algn="ctr"/>
+            <a:endParaRPr lang="fr-FR" dirty="0"/>
+          </a:p>
+        </p:txBody>
+      </p:sp>
+      <p:sp>
+        <p:nvSpPr>
+          <p:cNvPr id="5" name="Rectangle 4"/>
+          <p:cNvSpPr/>
+          <p:nvPr/>
+        </p:nvSpPr>
+        <p:spPr>
+          <a:xfrm>
+            <a:off x="3193771" y="998893"/>
+            <a:ext cx="1390944" cy="388307"/>
+          </a:xfrm>
+          <a:prstGeom prst="rect">
+            <a:avLst/>
+          </a:prstGeom>
+        </p:spPr>
+        <p:style>
+          <a:lnRef idx="2">
+            <a:schemeClr val="accent1">
+              <a:shade val="50000"/>
+            </a:schemeClr>
+          </a:lnRef>
+          <a:fillRef idx="1">
+            <a:schemeClr val="accent1"/>
+          </a:fillRef>
+          <a:effectRef idx="0">
+            <a:schemeClr val="accent1"/>
+          </a:effectRef>
+          <a:fontRef idx="minor">
+            <a:schemeClr val="lt1"/>
+          </a:fontRef>
+        </p:style>
+        <p:txBody>
+          <a:bodyPr rtlCol="0" anchor="ctr"/>
+          <a:lstStyle/>
+          <a:p>
+            <a:pPr algn="ctr"/>
+            <a:r>
+              <a:rPr lang="fr-FR"/>
+              <a:t>Nom auteur</a:t>
+            </a:r>
+            <a:endParaRPr lang="fr-FR" dirty="0"/>
+          </a:p>
+        </p:txBody>
+      </p:sp>
+      <p:sp>
+        <p:nvSpPr>
+          <p:cNvPr id="6" name="Rectangle 5"/>
+          <p:cNvSpPr/>
+          <p:nvPr/>
+        </p:nvSpPr>
+        <p:spPr>
+          <a:xfrm>
+            <a:off x="5974681" y="1008209"/>
+            <a:ext cx="821170" cy="388307"/>
+          </a:xfrm>
+          <a:prstGeom prst="rect">
+            <a:avLst/>
+          </a:prstGeom>
+        </p:spPr>
+        <p:style>
+          <a:lnRef idx="2">
+            <a:schemeClr val="accent1">
+              <a:shade val="50000"/>
+            </a:schemeClr>
+          </a:lnRef>
+          <a:fillRef idx="1">
+            <a:schemeClr val="accent1"/>
+          </a:fillRef>
+          <a:effectRef idx="0">
+            <a:schemeClr val="accent1"/>
+          </a:effectRef>
+          <a:fontRef idx="minor">
+            <a:schemeClr val="lt1"/>
+          </a:fontRef>
+        </p:style>
+        <p:txBody>
+          <a:bodyPr rtlCol="0" anchor="ctr"/>
+          <a:lstStyle/>
+          <a:p>
+            <a:pPr algn="ctr"/>
+            <a:r>
+              <a:rPr lang="fr-FR" dirty="0" smtClean="0"/>
+              <a:t> </a:t>
+            </a:r>
+            <a:r>
+              <a:rPr lang="fr-FR" sz="1300" dirty="0" smtClean="0"/>
+              <a:t>Création</a:t>
+            </a:r>
+            <a:endParaRPr lang="fr-FR" sz="1300" dirty="0"/>
+          </a:p>
+        </p:txBody>
+      </p:sp>
+      <p:sp>
+        <p:nvSpPr>
+          <p:cNvPr id="8" name="Rectangle 7"/>
+          <p:cNvSpPr/>
+          <p:nvPr/>
+        </p:nvSpPr>
+        <p:spPr>
+          <a:xfrm>
+            <a:off x="3382737" y="2459797"/>
+            <a:ext cx="2429339" cy="3572923"/>
           </a:xfrm>
           <a:prstGeom prst="rect">
             <a:avLst/>
@@ -5124,24 +5527,20 @@
           <a:lstStyle/>
           <a:p>
             <a:pPr algn="ctr"/>
-            <a:r>
-              <a:rPr lang="fr-FR" dirty="0" smtClean="0"/>
-              <a:t>Billet</a:t>
-            </a:r>
-            <a:endParaRPr lang="fr-FR" dirty="0"/>
-          </a:p>
-        </p:txBody>
-      </p:sp>
-      <p:sp>
-        <p:nvSpPr>
-          <p:cNvPr id="5" name="Rectangle 4"/>
-          <p:cNvSpPr/>
-          <p:nvPr/>
-        </p:nvSpPr>
-        <p:spPr>
-          <a:xfrm>
-            <a:off x="3798916" y="3757353"/>
-            <a:ext cx="3956859" cy="2934392"/>
+            <a:endParaRPr lang="fr-FR"/>
+          </a:p>
+        </p:txBody>
+      </p:sp>
+      <p:sp>
+        <p:nvSpPr>
+          <p:cNvPr id="28" name="Rectangle 27"/>
+          <p:cNvSpPr/>
+          <p:nvPr/>
+        </p:nvSpPr>
+        <p:spPr>
+          <a:xfrm>
+            <a:off x="6100175" y="2480827"/>
+            <a:ext cx="2204581" cy="3546285"/>
           </a:xfrm>
           <a:prstGeom prst="rect">
             <a:avLst/>
@@ -5171,20 +5570,325 @@
           <a:lstStyle/>
           <a:p>
             <a:pPr algn="ctr"/>
+            <a:r>
+              <a:rPr lang="fr-FR"/>
+              <a:t>Commentaires signalés</a:t>
+            </a:r>
+          </a:p>
+          <a:p>
+            <a:pPr algn="ctr"/>
+            <a:r>
+              <a:rPr lang="fr-FR"/>
+              <a:t>Avec date heure et nom du post</a:t>
+            </a:r>
+            <a:endParaRPr lang="fr-FR" dirty="0"/>
+          </a:p>
+        </p:txBody>
+      </p:sp>
+      <p:sp>
+        <p:nvSpPr>
+          <p:cNvPr id="29" name="Rectangle 28"/>
+          <p:cNvSpPr/>
+          <p:nvPr/>
+        </p:nvSpPr>
+        <p:spPr>
+          <a:xfrm>
+            <a:off x="5038236" y="2026998"/>
+            <a:ext cx="1603332" cy="249198"/>
+          </a:xfrm>
+          <a:prstGeom prst="rect">
+            <a:avLst/>
+          </a:prstGeom>
+          <a:solidFill>
+            <a:schemeClr val="accent6"/>
+          </a:solidFill>
+        </p:spPr>
+        <p:style>
+          <a:lnRef idx="2">
+            <a:schemeClr val="accent1">
+              <a:shade val="50000"/>
+            </a:schemeClr>
+          </a:lnRef>
+          <a:fillRef idx="1">
+            <a:schemeClr val="accent1"/>
+          </a:fillRef>
+          <a:effectRef idx="0">
+            <a:schemeClr val="accent1"/>
+          </a:effectRef>
+          <a:fontRef idx="minor">
+            <a:schemeClr val="lt1"/>
+          </a:fontRef>
+        </p:style>
+        <p:txBody>
+          <a:bodyPr rtlCol="0" anchor="ctr"/>
+          <a:lstStyle/>
+          <a:p>
+            <a:pPr algn="ctr"/>
+            <a:r>
+              <a:rPr lang="fr-FR" dirty="0"/>
+              <a:t>SECTION</a:t>
+            </a:r>
+            <a:endParaRPr lang="fr-FR" dirty="0"/>
+          </a:p>
+        </p:txBody>
+      </p:sp>
+      <p:sp>
+        <p:nvSpPr>
+          <p:cNvPr id="30" name="Rectangle 29"/>
+          <p:cNvSpPr/>
+          <p:nvPr/>
+        </p:nvSpPr>
+        <p:spPr>
+          <a:xfrm>
+            <a:off x="3724595" y="2459062"/>
+            <a:ext cx="1725701" cy="401452"/>
+          </a:xfrm>
+          <a:prstGeom prst="rect">
+            <a:avLst/>
+          </a:prstGeom>
+          <a:solidFill>
+            <a:schemeClr val="accent2"/>
+          </a:solidFill>
+        </p:spPr>
+        <p:style>
+          <a:lnRef idx="2">
+            <a:schemeClr val="accent1">
+              <a:shade val="50000"/>
+            </a:schemeClr>
+          </a:lnRef>
+          <a:fillRef idx="1">
+            <a:schemeClr val="accent1"/>
+          </a:fillRef>
+          <a:effectRef idx="0">
+            <a:schemeClr val="accent1"/>
+          </a:effectRef>
+          <a:fontRef idx="minor">
+            <a:schemeClr val="lt1"/>
+          </a:fontRef>
+        </p:style>
+        <p:txBody>
+          <a:bodyPr rtlCol="0" anchor="ctr"/>
+          <a:lstStyle/>
+          <a:p>
+            <a:pPr algn="ctr"/>
+            <a:r>
+              <a:rPr lang="fr-FR" dirty="0"/>
+              <a:t>Index des billets</a:t>
+            </a:r>
+            <a:endParaRPr lang="fr-FR" dirty="0"/>
+          </a:p>
+        </p:txBody>
+      </p:sp>
+      <p:sp>
+        <p:nvSpPr>
+          <p:cNvPr id="31" name="Rectangle 30"/>
+          <p:cNvSpPr/>
+          <p:nvPr/>
+        </p:nvSpPr>
+        <p:spPr>
+          <a:xfrm>
+            <a:off x="3474602" y="2901834"/>
+            <a:ext cx="2265661" cy="367424"/>
+          </a:xfrm>
+          <a:prstGeom prst="rect">
+            <a:avLst/>
+          </a:prstGeom>
+        </p:spPr>
+        <p:style>
+          <a:lnRef idx="2">
+            <a:schemeClr val="accent1">
+              <a:shade val="50000"/>
+            </a:schemeClr>
+          </a:lnRef>
+          <a:fillRef idx="1">
+            <a:schemeClr val="accent1"/>
+          </a:fillRef>
+          <a:effectRef idx="0">
+            <a:schemeClr val="accent1"/>
+          </a:effectRef>
+          <a:fontRef idx="minor">
+            <a:schemeClr val="lt1"/>
+          </a:fontRef>
+        </p:style>
+        <p:txBody>
+          <a:bodyPr rtlCol="0" anchor="ctr"/>
+          <a:lstStyle/>
+          <a:p>
+            <a:pPr algn="ctr"/>
             <a:endParaRPr lang="fr-FR"/>
           </a:p>
         </p:txBody>
       </p:sp>
       <p:sp>
         <p:nvSpPr>
-          <p:cNvPr id="8" name="Rectangle 7"/>
-          <p:cNvSpPr/>
-          <p:nvPr/>
-        </p:nvSpPr>
-        <p:spPr>
-          <a:xfrm>
-            <a:off x="3915295" y="4409585"/>
-            <a:ext cx="3740727" cy="432262"/>
+          <p:cNvPr id="32" name="Rectangle 31"/>
+          <p:cNvSpPr/>
+          <p:nvPr/>
+        </p:nvSpPr>
+        <p:spPr>
+          <a:xfrm>
+            <a:off x="3474602" y="3304125"/>
+            <a:ext cx="2265661" cy="367424"/>
+          </a:xfrm>
+          <a:prstGeom prst="rect">
+            <a:avLst/>
+          </a:prstGeom>
+        </p:spPr>
+        <p:style>
+          <a:lnRef idx="2">
+            <a:schemeClr val="accent1">
+              <a:shade val="50000"/>
+            </a:schemeClr>
+          </a:lnRef>
+          <a:fillRef idx="1">
+            <a:schemeClr val="accent1"/>
+          </a:fillRef>
+          <a:effectRef idx="0">
+            <a:schemeClr val="accent1"/>
+          </a:effectRef>
+          <a:fontRef idx="minor">
+            <a:schemeClr val="lt1"/>
+          </a:fontRef>
+        </p:style>
+        <p:txBody>
+          <a:bodyPr rtlCol="0" anchor="ctr"/>
+          <a:lstStyle/>
+          <a:p>
+            <a:pPr algn="ctr"/>
+            <a:endParaRPr lang="fr-FR"/>
+          </a:p>
+        </p:txBody>
+      </p:sp>
+      <p:sp>
+        <p:nvSpPr>
+          <p:cNvPr id="33" name="Rectangle 32"/>
+          <p:cNvSpPr/>
+          <p:nvPr/>
+        </p:nvSpPr>
+        <p:spPr>
+          <a:xfrm>
+            <a:off x="3455537" y="3705232"/>
+            <a:ext cx="2265661" cy="367424"/>
+          </a:xfrm>
+          <a:prstGeom prst="rect">
+            <a:avLst/>
+          </a:prstGeom>
+        </p:spPr>
+        <p:style>
+          <a:lnRef idx="2">
+            <a:schemeClr val="accent1">
+              <a:shade val="50000"/>
+            </a:schemeClr>
+          </a:lnRef>
+          <a:fillRef idx="1">
+            <a:schemeClr val="accent1"/>
+          </a:fillRef>
+          <a:effectRef idx="0">
+            <a:schemeClr val="accent1"/>
+          </a:effectRef>
+          <a:fontRef idx="minor">
+            <a:schemeClr val="lt1"/>
+          </a:fontRef>
+        </p:style>
+        <p:txBody>
+          <a:bodyPr rtlCol="0" anchor="ctr"/>
+          <a:lstStyle/>
+          <a:p>
+            <a:pPr algn="ctr"/>
+            <a:endParaRPr lang="fr-FR"/>
+          </a:p>
+        </p:txBody>
+      </p:sp>
+      <p:sp>
+        <p:nvSpPr>
+          <p:cNvPr id="34" name="Rectangle 33"/>
+          <p:cNvSpPr/>
+          <p:nvPr/>
+        </p:nvSpPr>
+        <p:spPr>
+          <a:xfrm>
+            <a:off x="3464280" y="4133981"/>
+            <a:ext cx="2265661" cy="367424"/>
+          </a:xfrm>
+          <a:prstGeom prst="rect">
+            <a:avLst/>
+          </a:prstGeom>
+        </p:spPr>
+        <p:style>
+          <a:lnRef idx="2">
+            <a:schemeClr val="accent1">
+              <a:shade val="50000"/>
+            </a:schemeClr>
+          </a:lnRef>
+          <a:fillRef idx="1">
+            <a:schemeClr val="accent1"/>
+          </a:fillRef>
+          <a:effectRef idx="0">
+            <a:schemeClr val="accent1"/>
+          </a:effectRef>
+          <a:fontRef idx="minor">
+            <a:schemeClr val="lt1"/>
+          </a:fontRef>
+        </p:style>
+        <p:txBody>
+          <a:bodyPr rtlCol="0" anchor="ctr"/>
+          <a:lstStyle/>
+          <a:p>
+            <a:pPr algn="ctr"/>
+            <a:endParaRPr lang="fr-FR"/>
+          </a:p>
+        </p:txBody>
+      </p:sp>
+      <p:sp>
+        <p:nvSpPr>
+          <p:cNvPr id="35" name="Rectangle 34"/>
+          <p:cNvSpPr/>
+          <p:nvPr/>
+        </p:nvSpPr>
+        <p:spPr>
+          <a:xfrm>
+            <a:off x="3464280" y="4614207"/>
+            <a:ext cx="2265661" cy="367424"/>
+          </a:xfrm>
+          <a:prstGeom prst="rect">
+            <a:avLst/>
+          </a:prstGeom>
+        </p:spPr>
+        <p:style>
+          <a:lnRef idx="2">
+            <a:schemeClr val="accent1">
+              <a:shade val="50000"/>
+            </a:schemeClr>
+          </a:lnRef>
+          <a:fillRef idx="1">
+            <a:schemeClr val="accent1"/>
+          </a:fillRef>
+          <a:effectRef idx="0">
+            <a:schemeClr val="accent1"/>
+          </a:effectRef>
+          <a:fontRef idx="minor">
+            <a:schemeClr val="lt1"/>
+          </a:fontRef>
+        </p:style>
+        <p:txBody>
+          <a:bodyPr rtlCol="0" anchor="ctr"/>
+          <a:lstStyle/>
+          <a:p>
+            <a:pPr algn="ctr"/>
+            <a:endParaRPr lang="fr-FR"/>
+          </a:p>
+        </p:txBody>
+      </p:sp>
+      <p:sp>
+        <p:nvSpPr>
+          <p:cNvPr id="36" name="Rectangle 35"/>
+          <p:cNvSpPr/>
+          <p:nvPr/>
+        </p:nvSpPr>
+        <p:spPr>
+          <a:xfrm>
+            <a:off x="3864453" y="5002090"/>
+            <a:ext cx="1246166" cy="302287"/>
           </a:xfrm>
           <a:prstGeom prst="rect">
             <a:avLst/>
@@ -5213,7 +5917,7 @@
             <a:pPr algn="ctr"/>
             <a:r>
               <a:rPr lang="fr-FR" dirty="0" smtClean="0"/>
-              <a:t>Commentaire</a:t>
+              <a:t>Pagination</a:t>
             </a:r>
             <a:endParaRPr lang="fr-FR" dirty="0"/>
           </a:p>
@@ -5221,43 +5925,46 @@
       </p:sp>
       <p:sp>
         <p:nvSpPr>
-          <p:cNvPr id="9" name="Rectangle 8"/>
-          <p:cNvSpPr/>
-          <p:nvPr/>
-        </p:nvSpPr>
-        <p:spPr>
-          <a:xfrm>
-            <a:off x="3915295" y="4958225"/>
-            <a:ext cx="3740727" cy="432262"/>
-          </a:xfrm>
-          <a:prstGeom prst="rect">
-            <a:avLst/>
-          </a:prstGeom>
-        </p:spPr>
-        <p:style>
-          <a:lnRef idx="2">
-            <a:schemeClr val="accent1">
-              <a:shade val="50000"/>
-            </a:schemeClr>
-          </a:lnRef>
-          <a:fillRef idx="1">
-            <a:schemeClr val="accent1"/>
-          </a:fillRef>
-          <a:effectRef idx="0">
-            <a:schemeClr val="accent1"/>
-          </a:effectRef>
-          <a:fontRef idx="minor">
-            <a:schemeClr val="lt1"/>
-          </a:fontRef>
-        </p:style>
-        <p:txBody>
-          <a:bodyPr rtlCol="0" anchor="ctr"/>
-          <a:lstStyle/>
-          <a:p>
-            <a:pPr algn="ctr"/>
-            <a:r>
-              <a:rPr lang="fr-FR" smtClean="0"/>
-              <a:t>Commentaire</a:t>
+          <p:cNvPr id="37" name="Rectangle 36"/>
+          <p:cNvSpPr/>
+          <p:nvPr/>
+        </p:nvSpPr>
+        <p:spPr>
+          <a:xfrm>
+            <a:off x="4690040" y="985452"/>
+            <a:ext cx="1070026" cy="266742"/>
+          </a:xfrm>
+          <a:prstGeom prst="rect">
+            <a:avLst/>
+          </a:prstGeom>
+          <a:solidFill>
+            <a:schemeClr val="accent6"/>
+          </a:solidFill>
+        </p:spPr>
+        <p:style>
+          <a:lnRef idx="2">
+            <a:schemeClr val="accent1">
+              <a:shade val="50000"/>
+            </a:schemeClr>
+          </a:lnRef>
+          <a:fillRef idx="1">
+            <a:schemeClr val="accent1"/>
+          </a:fillRef>
+          <a:effectRef idx="0">
+            <a:schemeClr val="accent1"/>
+          </a:effectRef>
+          <a:fontRef idx="minor">
+            <a:schemeClr val="lt1"/>
+          </a:fontRef>
+        </p:style>
+        <p:txBody>
+          <a:bodyPr rtlCol="0" anchor="ctr"/>
+          <a:lstStyle/>
+          <a:p>
+            <a:pPr algn="ctr"/>
+            <a:r>
+              <a:rPr lang="fr-FR" dirty="0" smtClean="0"/>
+              <a:t>HEADER</a:t>
             </a:r>
             <a:endParaRPr lang="fr-FR" dirty="0"/>
           </a:p>
@@ -5265,415 +5972,96 @@
       </p:sp>
       <p:sp>
         <p:nvSpPr>
-          <p:cNvPr id="10" name="Rectangle 9"/>
-          <p:cNvSpPr/>
-          <p:nvPr/>
-        </p:nvSpPr>
-        <p:spPr>
-          <a:xfrm>
-            <a:off x="3915295" y="5506865"/>
-            <a:ext cx="3740727" cy="432262"/>
-          </a:xfrm>
-          <a:prstGeom prst="rect">
-            <a:avLst/>
-          </a:prstGeom>
-        </p:spPr>
-        <p:style>
-          <a:lnRef idx="2">
-            <a:schemeClr val="accent1">
-              <a:shade val="50000"/>
-            </a:schemeClr>
-          </a:lnRef>
-          <a:fillRef idx="1">
-            <a:schemeClr val="accent1"/>
-          </a:fillRef>
-          <a:effectRef idx="0">
-            <a:schemeClr val="accent1"/>
-          </a:effectRef>
-          <a:fontRef idx="minor">
-            <a:schemeClr val="lt1"/>
-          </a:fontRef>
-        </p:style>
-        <p:txBody>
-          <a:bodyPr rtlCol="0" anchor="ctr"/>
-          <a:lstStyle/>
-          <a:p>
-            <a:pPr algn="ctr"/>
-            <a:r>
-              <a:rPr lang="fr-FR" smtClean="0"/>
-              <a:t>Commentaire</a:t>
-            </a:r>
-            <a:endParaRPr lang="fr-FR" dirty="0"/>
-          </a:p>
-        </p:txBody>
-      </p:sp>
-      <p:sp>
-        <p:nvSpPr>
-          <p:cNvPr id="11" name="Rectangle 10"/>
-          <p:cNvSpPr/>
-          <p:nvPr/>
-        </p:nvSpPr>
-        <p:spPr>
-          <a:xfrm>
-            <a:off x="3915295" y="6081561"/>
-            <a:ext cx="3740727" cy="432262"/>
-          </a:xfrm>
-          <a:prstGeom prst="rect">
-            <a:avLst/>
-          </a:prstGeom>
-        </p:spPr>
-        <p:style>
-          <a:lnRef idx="2">
-            <a:schemeClr val="accent1">
-              <a:shade val="50000"/>
-            </a:schemeClr>
-          </a:lnRef>
-          <a:fillRef idx="1">
-            <a:schemeClr val="accent1"/>
-          </a:fillRef>
-          <a:effectRef idx="0">
-            <a:schemeClr val="accent1"/>
-          </a:effectRef>
-          <a:fontRef idx="minor">
-            <a:schemeClr val="lt1"/>
-          </a:fontRef>
-        </p:style>
-        <p:txBody>
-          <a:bodyPr rtlCol="0" anchor="ctr"/>
-          <a:lstStyle/>
-          <a:p>
-            <a:pPr algn="ctr"/>
-            <a:r>
-              <a:rPr lang="fr-FR" smtClean="0"/>
-              <a:t>Commentaire</a:t>
-            </a:r>
-            <a:endParaRPr lang="fr-FR" dirty="0"/>
-          </a:p>
-        </p:txBody>
-      </p:sp>
-      <p:sp>
-        <p:nvSpPr>
-          <p:cNvPr id="18" name="Rectangle 17"/>
-          <p:cNvSpPr/>
-          <p:nvPr/>
-        </p:nvSpPr>
-        <p:spPr>
-          <a:xfrm>
-            <a:off x="4015047" y="4644577"/>
-            <a:ext cx="631768" cy="161782"/>
-          </a:xfrm>
-          <a:prstGeom prst="rect">
-            <a:avLst/>
-          </a:prstGeom>
-          <a:solidFill>
-            <a:schemeClr val="accent4"/>
-          </a:solidFill>
-        </p:spPr>
-        <p:style>
-          <a:lnRef idx="2">
-            <a:schemeClr val="accent1">
-              <a:shade val="50000"/>
-            </a:schemeClr>
-          </a:lnRef>
-          <a:fillRef idx="1">
-            <a:schemeClr val="accent1"/>
-          </a:fillRef>
-          <a:effectRef idx="0">
-            <a:schemeClr val="accent1"/>
-          </a:effectRef>
-          <a:fontRef idx="minor">
-            <a:schemeClr val="lt1"/>
-          </a:fontRef>
-        </p:style>
-        <p:txBody>
-          <a:bodyPr rtlCol="0" anchor="ctr"/>
-          <a:lstStyle/>
-          <a:p>
-            <a:pPr algn="ctr"/>
-            <a:r>
-              <a:rPr lang="fr-FR" sz="1000" dirty="0" smtClean="0">
-                <a:solidFill>
-                  <a:schemeClr val="tx1"/>
-                </a:solidFill>
-              </a:rPr>
-              <a:t>Signaler</a:t>
-            </a:r>
-            <a:endParaRPr lang="fr-FR" sz="1000" dirty="0">
-              <a:solidFill>
-                <a:schemeClr val="tx1"/>
-              </a:solidFill>
-            </a:endParaRPr>
-          </a:p>
-        </p:txBody>
-      </p:sp>
-      <p:sp>
-        <p:nvSpPr>
-          <p:cNvPr id="19" name="Rectangle 18"/>
-          <p:cNvSpPr/>
-          <p:nvPr/>
-        </p:nvSpPr>
-        <p:spPr>
-          <a:xfrm>
-            <a:off x="4015047" y="5201847"/>
-            <a:ext cx="631768" cy="161782"/>
-          </a:xfrm>
-          <a:prstGeom prst="rect">
-            <a:avLst/>
-          </a:prstGeom>
-          <a:solidFill>
-            <a:schemeClr val="accent4"/>
-          </a:solidFill>
-        </p:spPr>
-        <p:style>
-          <a:lnRef idx="2">
-            <a:schemeClr val="accent1">
-              <a:shade val="50000"/>
-            </a:schemeClr>
-          </a:lnRef>
-          <a:fillRef idx="1">
-            <a:schemeClr val="accent1"/>
-          </a:fillRef>
-          <a:effectRef idx="0">
-            <a:schemeClr val="accent1"/>
-          </a:effectRef>
-          <a:fontRef idx="minor">
-            <a:schemeClr val="lt1"/>
-          </a:fontRef>
-        </p:style>
-        <p:txBody>
-          <a:bodyPr rtlCol="0" anchor="ctr"/>
-          <a:lstStyle/>
-          <a:p>
-            <a:pPr algn="ctr"/>
-            <a:r>
-              <a:rPr lang="fr-FR" sz="1000" dirty="0" smtClean="0">
-                <a:solidFill>
-                  <a:schemeClr val="tx1"/>
-                </a:solidFill>
-              </a:rPr>
-              <a:t>Signaler</a:t>
-            </a:r>
-            <a:endParaRPr lang="fr-FR" sz="1000" dirty="0">
-              <a:solidFill>
-                <a:schemeClr val="tx1"/>
-              </a:solidFill>
-            </a:endParaRPr>
-          </a:p>
-        </p:txBody>
-      </p:sp>
-      <p:sp>
-        <p:nvSpPr>
-          <p:cNvPr id="20" name="Rectangle 19"/>
-          <p:cNvSpPr/>
-          <p:nvPr/>
-        </p:nvSpPr>
-        <p:spPr>
-          <a:xfrm>
-            <a:off x="4015047" y="5741857"/>
-            <a:ext cx="631768" cy="161782"/>
-          </a:xfrm>
-          <a:prstGeom prst="rect">
-            <a:avLst/>
-          </a:prstGeom>
-          <a:solidFill>
-            <a:schemeClr val="accent4"/>
-          </a:solidFill>
-        </p:spPr>
-        <p:style>
-          <a:lnRef idx="2">
-            <a:schemeClr val="accent1">
-              <a:shade val="50000"/>
-            </a:schemeClr>
-          </a:lnRef>
-          <a:fillRef idx="1">
-            <a:schemeClr val="accent1"/>
-          </a:fillRef>
-          <a:effectRef idx="0">
-            <a:schemeClr val="accent1"/>
-          </a:effectRef>
-          <a:fontRef idx="minor">
-            <a:schemeClr val="lt1"/>
-          </a:fontRef>
-        </p:style>
-        <p:txBody>
-          <a:bodyPr rtlCol="0" anchor="ctr"/>
-          <a:lstStyle/>
-          <a:p>
-            <a:pPr algn="ctr"/>
-            <a:r>
-              <a:rPr lang="fr-FR" sz="1000" dirty="0" smtClean="0">
-                <a:solidFill>
-                  <a:schemeClr val="tx1"/>
-                </a:solidFill>
-              </a:rPr>
-              <a:t>Signaler</a:t>
-            </a:r>
-            <a:endParaRPr lang="fr-FR" sz="1000" dirty="0">
-              <a:solidFill>
-                <a:schemeClr val="tx1"/>
-              </a:solidFill>
-            </a:endParaRPr>
-          </a:p>
-        </p:txBody>
-      </p:sp>
-      <p:sp>
-        <p:nvSpPr>
-          <p:cNvPr id="21" name="Rectangle 20"/>
-          <p:cNvSpPr/>
-          <p:nvPr/>
-        </p:nvSpPr>
-        <p:spPr>
-          <a:xfrm>
-            <a:off x="4015047" y="6325183"/>
-            <a:ext cx="631768" cy="161782"/>
-          </a:xfrm>
-          <a:prstGeom prst="rect">
-            <a:avLst/>
-          </a:prstGeom>
-          <a:solidFill>
-            <a:schemeClr val="accent4"/>
-          </a:solidFill>
-        </p:spPr>
-        <p:style>
-          <a:lnRef idx="2">
-            <a:schemeClr val="accent1">
-              <a:shade val="50000"/>
-            </a:schemeClr>
-          </a:lnRef>
-          <a:fillRef idx="1">
-            <a:schemeClr val="accent1"/>
-          </a:fillRef>
-          <a:effectRef idx="0">
-            <a:schemeClr val="accent1"/>
-          </a:effectRef>
-          <a:fontRef idx="minor">
-            <a:schemeClr val="lt1"/>
-          </a:fontRef>
-        </p:style>
-        <p:txBody>
-          <a:bodyPr rtlCol="0" anchor="ctr"/>
-          <a:lstStyle/>
-          <a:p>
-            <a:pPr algn="ctr"/>
-            <a:r>
-              <a:rPr lang="fr-FR" sz="1000" dirty="0" smtClean="0">
-                <a:solidFill>
-                  <a:schemeClr val="tx1"/>
-                </a:solidFill>
-              </a:rPr>
-              <a:t>Signaler</a:t>
-            </a:r>
-            <a:endParaRPr lang="fr-FR" sz="1000" dirty="0">
-              <a:solidFill>
-                <a:schemeClr val="tx1"/>
-              </a:solidFill>
-            </a:endParaRPr>
-          </a:p>
-        </p:txBody>
-      </p:sp>
-      <p:sp>
-        <p:nvSpPr>
-          <p:cNvPr id="16" name="Rectangle 15"/>
-          <p:cNvSpPr/>
-          <p:nvPr/>
-        </p:nvSpPr>
-        <p:spPr>
-          <a:xfrm>
-            <a:off x="3915295" y="3876935"/>
-            <a:ext cx="3740727" cy="432262"/>
-          </a:xfrm>
-          <a:prstGeom prst="rect">
-            <a:avLst/>
-          </a:prstGeom>
-        </p:spPr>
-        <p:style>
-          <a:lnRef idx="2">
-            <a:schemeClr val="accent1">
-              <a:shade val="50000"/>
-            </a:schemeClr>
-          </a:lnRef>
-          <a:fillRef idx="1">
-            <a:schemeClr val="accent1"/>
-          </a:fillRef>
-          <a:effectRef idx="0">
-            <a:schemeClr val="accent1"/>
-          </a:effectRef>
-          <a:fontRef idx="minor">
-            <a:schemeClr val="lt1"/>
-          </a:fontRef>
-        </p:style>
-        <p:txBody>
-          <a:bodyPr rtlCol="0" anchor="ctr"/>
-          <a:lstStyle/>
-          <a:p>
-            <a:pPr algn="ctr"/>
-            <a:r>
-              <a:rPr lang="fr-FR" dirty="0" smtClean="0"/>
-              <a:t>Commentaire</a:t>
-            </a:r>
-            <a:endParaRPr lang="fr-FR" dirty="0"/>
-          </a:p>
-        </p:txBody>
-      </p:sp>
-      <p:sp>
-        <p:nvSpPr>
-          <p:cNvPr id="17" name="Rectangle 16"/>
-          <p:cNvSpPr/>
-          <p:nvPr/>
-        </p:nvSpPr>
-        <p:spPr>
-          <a:xfrm>
-            <a:off x="4015047" y="4105369"/>
-            <a:ext cx="631768" cy="161782"/>
-          </a:xfrm>
-          <a:prstGeom prst="rect">
-            <a:avLst/>
-          </a:prstGeom>
-          <a:solidFill>
-            <a:schemeClr val="accent4"/>
-          </a:solidFill>
-        </p:spPr>
-        <p:style>
-          <a:lnRef idx="2">
-            <a:schemeClr val="accent1">
-              <a:shade val="50000"/>
-            </a:schemeClr>
-          </a:lnRef>
-          <a:fillRef idx="1">
-            <a:schemeClr val="accent1"/>
-          </a:fillRef>
-          <a:effectRef idx="0">
-            <a:schemeClr val="accent1"/>
-          </a:effectRef>
-          <a:fontRef idx="minor">
-            <a:schemeClr val="lt1"/>
-          </a:fontRef>
-        </p:style>
-        <p:txBody>
-          <a:bodyPr rtlCol="0" anchor="ctr"/>
-          <a:lstStyle/>
-          <a:p>
-            <a:pPr algn="ctr"/>
-            <a:r>
-              <a:rPr lang="fr-FR" sz="1000" dirty="0" smtClean="0">
-                <a:solidFill>
-                  <a:schemeClr val="tx1"/>
-                </a:solidFill>
-              </a:rPr>
-              <a:t>Signaler</a:t>
-            </a:r>
-            <a:endParaRPr lang="fr-FR" sz="1000" dirty="0">
-              <a:solidFill>
-                <a:schemeClr val="tx1"/>
-              </a:solidFill>
-            </a:endParaRPr>
+          <p:cNvPr id="38" name="Rectangle 37"/>
+          <p:cNvSpPr/>
+          <p:nvPr/>
+        </p:nvSpPr>
+        <p:spPr>
+          <a:xfrm>
+            <a:off x="6794450" y="1008209"/>
+            <a:ext cx="791463" cy="388307"/>
+          </a:xfrm>
+          <a:prstGeom prst="rect">
+            <a:avLst/>
+          </a:prstGeom>
+        </p:spPr>
+        <p:style>
+          <a:lnRef idx="2">
+            <a:schemeClr val="accent1">
+              <a:shade val="50000"/>
+            </a:schemeClr>
+          </a:lnRef>
+          <a:fillRef idx="1">
+            <a:schemeClr val="accent1"/>
+          </a:fillRef>
+          <a:effectRef idx="0">
+            <a:schemeClr val="accent1"/>
+          </a:effectRef>
+          <a:fontRef idx="minor">
+            <a:schemeClr val="lt1"/>
+          </a:fontRef>
+        </p:style>
+        <p:txBody>
+          <a:bodyPr rtlCol="0" anchor="ctr"/>
+          <a:lstStyle/>
+          <a:p>
+            <a:pPr algn="ctr"/>
+            <a:r>
+              <a:rPr lang="fr-FR" sz="1300" dirty="0" smtClean="0"/>
+              <a:t>Edition</a:t>
+            </a:r>
+            <a:endParaRPr lang="fr-FR" sz="1300" dirty="0"/>
+          </a:p>
+        </p:txBody>
+      </p:sp>
+      <p:sp>
+        <p:nvSpPr>
+          <p:cNvPr id="39" name="Rectangle 38"/>
+          <p:cNvSpPr/>
+          <p:nvPr/>
+        </p:nvSpPr>
+        <p:spPr>
+          <a:xfrm>
+            <a:off x="7585913" y="998892"/>
+            <a:ext cx="914780" cy="388307"/>
+          </a:xfrm>
+          <a:prstGeom prst="rect">
+            <a:avLst/>
+          </a:prstGeom>
+        </p:spPr>
+        <p:style>
+          <a:lnRef idx="2">
+            <a:schemeClr val="accent1">
+              <a:shade val="50000"/>
+            </a:schemeClr>
+          </a:lnRef>
+          <a:fillRef idx="1">
+            <a:schemeClr val="accent1"/>
+          </a:fillRef>
+          <a:effectRef idx="0">
+            <a:schemeClr val="accent1"/>
+          </a:effectRef>
+          <a:fontRef idx="minor">
+            <a:schemeClr val="lt1"/>
+          </a:fontRef>
+        </p:style>
+        <p:txBody>
+          <a:bodyPr rtlCol="0" anchor="ctr"/>
+          <a:lstStyle/>
+          <a:p>
+            <a:pPr algn="ctr"/>
+            <a:r>
+              <a:rPr lang="fr-FR" sz="1300" dirty="0" smtClean="0"/>
+              <a:t>Connexion</a:t>
+            </a:r>
+            <a:endParaRPr lang="fr-FR" sz="1300" dirty="0"/>
           </a:p>
         </p:txBody>
       </p:sp>
     </p:spTree>
     <p:extLst>
       <p:ext uri="{BB962C8B-B14F-4D97-AF65-F5344CB8AC3E}">
-        <p14:creationId xmlns:p14="http://schemas.microsoft.com/office/powerpoint/2010/main" val="3125935382"/>
+        <p14:creationId xmlns:p14="http://schemas.microsoft.com/office/powerpoint/2010/main" val="3791358261"/>
       </p:ext>
     </p:extLst>
   </p:cSld>
@@ -5719,21 +6107,15 @@
         </p:nvSpPr>
         <p:spPr/>
         <p:txBody>
-          <a:bodyPr>
-            <a:normAutofit/>
-          </a:bodyPr>
-          <a:lstStyle/>
-          <a:p>
-            <a:pPr algn="ctr"/>
-            <a:r>
-              <a:rPr lang="fr-FR" sz="3500" dirty="0" smtClean="0"/>
-              <a:t>Page de lecture d’un </a:t>
-            </a:r>
-            <a:r>
-              <a:rPr lang="fr-FR" sz="3500" dirty="0" smtClean="0"/>
-              <a:t>billet par un visiteur connecté</a:t>
-            </a:r>
-            <a:endParaRPr lang="fr-FR" sz="3500" dirty="0"/>
+          <a:bodyPr/>
+          <a:lstStyle/>
+          <a:p>
+            <a:pPr algn="ctr"/>
+            <a:r>
+              <a:rPr lang="fr-FR" dirty="0" smtClean="0"/>
+              <a:t>Page de lecture d’un billet en général</a:t>
+            </a:r>
+            <a:endParaRPr lang="fr-FR" dirty="0"/>
           </a:p>
         </p:txBody>
       </p:sp>
@@ -5864,101 +6246,6 @@
           <a:p>
             <a:pPr algn="ctr"/>
             <a:endParaRPr lang="fr-FR"/>
-          </a:p>
-        </p:txBody>
-      </p:sp>
-      <p:sp>
-        <p:nvSpPr>
-          <p:cNvPr id="6" name="Rectangle 5"/>
-          <p:cNvSpPr/>
-          <p:nvPr/>
-        </p:nvSpPr>
-        <p:spPr>
-          <a:xfrm>
-            <a:off x="3915295" y="3953654"/>
-            <a:ext cx="3740727" cy="327401"/>
-          </a:xfrm>
-          <a:prstGeom prst="rect">
-            <a:avLst/>
-          </a:prstGeom>
-          <a:solidFill>
-            <a:schemeClr val="accent6"/>
-          </a:solidFill>
-        </p:spPr>
-        <p:style>
-          <a:lnRef idx="2">
-            <a:schemeClr val="accent1">
-              <a:shade val="50000"/>
-            </a:schemeClr>
-          </a:lnRef>
-          <a:fillRef idx="1">
-            <a:schemeClr val="accent1"/>
-          </a:fillRef>
-          <a:effectRef idx="0">
-            <a:schemeClr val="accent1"/>
-          </a:effectRef>
-          <a:fontRef idx="minor">
-            <a:schemeClr val="lt1"/>
-          </a:fontRef>
-        </p:style>
-        <p:txBody>
-          <a:bodyPr rtlCol="0" anchor="ctr"/>
-          <a:lstStyle/>
-          <a:p>
-            <a:pPr algn="ctr"/>
-            <a:r>
-              <a:rPr lang="fr-FR" dirty="0" smtClean="0"/>
-              <a:t>Formulaire d’ajout de </a:t>
-            </a:r>
-            <a:r>
-              <a:rPr lang="fr-FR" dirty="0" err="1" smtClean="0"/>
-              <a:t>comments</a:t>
-            </a:r>
-            <a:endParaRPr lang="fr-FR" dirty="0"/>
-          </a:p>
-        </p:txBody>
-      </p:sp>
-      <p:sp>
-        <p:nvSpPr>
-          <p:cNvPr id="7" name="Rectangle 6"/>
-          <p:cNvSpPr/>
-          <p:nvPr/>
-        </p:nvSpPr>
-        <p:spPr>
-          <a:xfrm>
-            <a:off x="7394172" y="4030070"/>
-            <a:ext cx="207818" cy="174567"/>
-          </a:xfrm>
-          <a:prstGeom prst="rect">
-            <a:avLst/>
-          </a:prstGeom>
-        </p:spPr>
-        <p:style>
-          <a:lnRef idx="2">
-            <a:schemeClr val="accent1">
-              <a:shade val="50000"/>
-            </a:schemeClr>
-          </a:lnRef>
-          <a:fillRef idx="1">
-            <a:schemeClr val="accent1"/>
-          </a:fillRef>
-          <a:effectRef idx="0">
-            <a:schemeClr val="accent1"/>
-          </a:effectRef>
-          <a:fontRef idx="minor">
-            <a:schemeClr val="lt1"/>
-          </a:fontRef>
-        </p:style>
-        <p:txBody>
-          <a:bodyPr rtlCol="0" anchor="ctr"/>
-          <a:lstStyle/>
-          <a:p>
-            <a:pPr algn="ctr"/>
-            <a:r>
-              <a:rPr lang="fr-FR" dirty="0" smtClean="0"/>
-              <a:t>+</a:t>
-            </a:r>
-            <a:endParaRPr lang="fr-FR" dirty="0"/>
           </a:p>
         </p:txBody>
       </p:sp>
@@ -6358,10 +6645,109 @@
           </a:p>
         </p:txBody>
       </p:sp>
+      <p:sp>
+        <p:nvSpPr>
+          <p:cNvPr id="16" name="Rectangle 15"/>
+          <p:cNvSpPr/>
+          <p:nvPr/>
+        </p:nvSpPr>
+        <p:spPr>
+          <a:xfrm>
+            <a:off x="3915295" y="3876935"/>
+            <a:ext cx="3740727" cy="432262"/>
+          </a:xfrm>
+          <a:prstGeom prst="rect">
+            <a:avLst/>
+          </a:prstGeom>
+        </p:spPr>
+        <p:style>
+          <a:lnRef idx="2">
+            <a:schemeClr val="accent1">
+              <a:shade val="50000"/>
+            </a:schemeClr>
+          </a:lnRef>
+          <a:fillRef idx="1">
+            <a:schemeClr val="accent1"/>
+          </a:fillRef>
+          <a:effectRef idx="0">
+            <a:schemeClr val="accent1"/>
+          </a:effectRef>
+          <a:fontRef idx="minor">
+            <a:schemeClr val="lt1"/>
+          </a:fontRef>
+        </p:style>
+        <p:txBody>
+          <a:bodyPr rtlCol="0" anchor="ctr"/>
+          <a:lstStyle/>
+          <a:p>
+            <a:pPr algn="ctr"/>
+            <a:r>
+              <a:rPr lang="fr-FR" dirty="0" smtClean="0"/>
+              <a:t>Commentaire</a:t>
+            </a:r>
+            <a:endParaRPr lang="fr-FR" dirty="0"/>
+          </a:p>
+        </p:txBody>
+      </p:sp>
+      <p:sp>
+        <p:nvSpPr>
+          <p:cNvPr id="17" name="Rectangle 16"/>
+          <p:cNvSpPr/>
+          <p:nvPr/>
+        </p:nvSpPr>
+        <p:spPr>
+          <a:xfrm>
+            <a:off x="4015047" y="4105369"/>
+            <a:ext cx="631768" cy="161782"/>
+          </a:xfrm>
+          <a:prstGeom prst="rect">
+            <a:avLst/>
+          </a:prstGeom>
+          <a:solidFill>
+            <a:schemeClr val="accent4"/>
+          </a:solidFill>
+        </p:spPr>
+        <p:style>
+          <a:lnRef idx="2">
+            <a:schemeClr val="accent1">
+              <a:shade val="50000"/>
+            </a:schemeClr>
+          </a:lnRef>
+          <a:fillRef idx="1">
+            <a:schemeClr val="accent1"/>
+          </a:fillRef>
+          <a:effectRef idx="0">
+            <a:schemeClr val="accent1"/>
+          </a:effectRef>
+          <a:fontRef idx="minor">
+            <a:schemeClr val="lt1"/>
+          </a:fontRef>
+        </p:style>
+        <p:txBody>
+          <a:bodyPr rtlCol="0" anchor="ctr"/>
+          <a:lstStyle/>
+          <a:p>
+            <a:pPr algn="ctr"/>
+            <a:r>
+              <a:rPr lang="fr-FR" sz="1000" dirty="0" smtClean="0">
+                <a:solidFill>
+                  <a:schemeClr val="tx1"/>
+                </a:solidFill>
+              </a:rPr>
+              <a:t>Signaler</a:t>
+            </a:r>
+            <a:endParaRPr lang="fr-FR" sz="1000" dirty="0">
+              <a:solidFill>
+                <a:schemeClr val="tx1"/>
+              </a:solidFill>
+            </a:endParaRPr>
+          </a:p>
+        </p:txBody>
+      </p:sp>
     </p:spTree>
     <p:extLst>
       <p:ext uri="{BB962C8B-B14F-4D97-AF65-F5344CB8AC3E}">
-        <p14:creationId xmlns:p14="http://schemas.microsoft.com/office/powerpoint/2010/main" val="1251785626"/>
+        <p14:creationId xmlns:p14="http://schemas.microsoft.com/office/powerpoint/2010/main" val="3125935382"/>
       </p:ext>
     </p:extLst>
   </p:cSld>
@@ -6407,19 +6793,17 @@
         </p:nvSpPr>
         <p:spPr/>
         <p:txBody>
-          <a:bodyPr/>
-          <a:lstStyle/>
-          <a:p>
-            <a:pPr algn="ctr"/>
-            <a:r>
-              <a:rPr lang="fr-FR" dirty="0" smtClean="0"/>
-              <a:t>Page de lecture d’un </a:t>
-            </a:r>
-            <a:r>
-              <a:rPr lang="fr-FR" dirty="0" smtClean="0"/>
-              <a:t>billet par l’admin</a:t>
-            </a:r>
-            <a:endParaRPr lang="fr-FR" dirty="0"/>
+          <a:bodyPr>
+            <a:normAutofit/>
+          </a:bodyPr>
+          <a:lstStyle/>
+          <a:p>
+            <a:pPr algn="ctr"/>
+            <a:r>
+              <a:rPr lang="fr-FR" sz="3500" dirty="0" smtClean="0"/>
+              <a:t>Page de lecture d’un billet par un visiteur connecté</a:t>
+            </a:r>
+            <a:endParaRPr lang="fr-FR" sz="3500" dirty="0"/>
           </a:p>
         </p:txBody>
       </p:sp>
@@ -6555,6 +6939,101 @@
       </p:sp>
       <p:sp>
         <p:nvSpPr>
+          <p:cNvPr id="6" name="Rectangle 5"/>
+          <p:cNvSpPr/>
+          <p:nvPr/>
+        </p:nvSpPr>
+        <p:spPr>
+          <a:xfrm>
+            <a:off x="3915295" y="3953654"/>
+            <a:ext cx="3740727" cy="327401"/>
+          </a:xfrm>
+          <a:prstGeom prst="rect">
+            <a:avLst/>
+          </a:prstGeom>
+          <a:solidFill>
+            <a:schemeClr val="accent6"/>
+          </a:solidFill>
+        </p:spPr>
+        <p:style>
+          <a:lnRef idx="2">
+            <a:schemeClr val="accent1">
+              <a:shade val="50000"/>
+            </a:schemeClr>
+          </a:lnRef>
+          <a:fillRef idx="1">
+            <a:schemeClr val="accent1"/>
+          </a:fillRef>
+          <a:effectRef idx="0">
+            <a:schemeClr val="accent1"/>
+          </a:effectRef>
+          <a:fontRef idx="minor">
+            <a:schemeClr val="lt1"/>
+          </a:fontRef>
+        </p:style>
+        <p:txBody>
+          <a:bodyPr rtlCol="0" anchor="ctr"/>
+          <a:lstStyle/>
+          <a:p>
+            <a:pPr algn="ctr"/>
+            <a:r>
+              <a:rPr lang="fr-FR" dirty="0" smtClean="0"/>
+              <a:t>Formulaire d’ajout de </a:t>
+            </a:r>
+            <a:r>
+              <a:rPr lang="fr-FR" dirty="0" err="1" smtClean="0"/>
+              <a:t>comments</a:t>
+            </a:r>
+            <a:endParaRPr lang="fr-FR" dirty="0"/>
+          </a:p>
+        </p:txBody>
+      </p:sp>
+      <p:sp>
+        <p:nvSpPr>
+          <p:cNvPr id="7" name="Rectangle 6"/>
+          <p:cNvSpPr/>
+          <p:nvPr/>
+        </p:nvSpPr>
+        <p:spPr>
+          <a:xfrm>
+            <a:off x="7394172" y="4030070"/>
+            <a:ext cx="207818" cy="174567"/>
+          </a:xfrm>
+          <a:prstGeom prst="rect">
+            <a:avLst/>
+          </a:prstGeom>
+        </p:spPr>
+        <p:style>
+          <a:lnRef idx="2">
+            <a:schemeClr val="accent1">
+              <a:shade val="50000"/>
+            </a:schemeClr>
+          </a:lnRef>
+          <a:fillRef idx="1">
+            <a:schemeClr val="accent1"/>
+          </a:fillRef>
+          <a:effectRef idx="0">
+            <a:schemeClr val="accent1"/>
+          </a:effectRef>
+          <a:fontRef idx="minor">
+            <a:schemeClr val="lt1"/>
+          </a:fontRef>
+        </p:style>
+        <p:txBody>
+          <a:bodyPr rtlCol="0" anchor="ctr"/>
+          <a:lstStyle/>
+          <a:p>
+            <a:pPr algn="ctr"/>
+            <a:r>
+              <a:rPr lang="fr-FR" dirty="0" smtClean="0"/>
+              <a:t>+</a:t>
+            </a:r>
+            <a:endParaRPr lang="fr-FR" dirty="0"/>
+          </a:p>
+        </p:txBody>
+      </p:sp>
+      <p:sp>
+        <p:nvSpPr>
           <p:cNvPr id="8" name="Rectangle 7"/>
           <p:cNvSpPr/>
           <p:nvPr/>
@@ -6731,492 +7210,228 @@
       </p:sp>
       <p:sp>
         <p:nvSpPr>
-          <p:cNvPr id="22" name="Rectangle 21"/>
-          <p:cNvSpPr/>
-          <p:nvPr/>
-        </p:nvSpPr>
-        <p:spPr>
-          <a:xfrm>
-            <a:off x="6531725" y="4683723"/>
-            <a:ext cx="743989" cy="138837"/>
+          <p:cNvPr id="18" name="Rectangle 17"/>
+          <p:cNvSpPr/>
+          <p:nvPr/>
+        </p:nvSpPr>
+        <p:spPr>
+          <a:xfrm>
+            <a:off x="4015047" y="4644577"/>
+            <a:ext cx="631768" cy="161782"/>
           </a:xfrm>
           <a:prstGeom prst="rect">
             <a:avLst/>
           </a:prstGeom>
           <a:solidFill>
-            <a:srgbClr val="FF0000"/>
+            <a:schemeClr val="accent4"/>
           </a:solidFill>
         </p:spPr>
         <p:style>
-          <a:lnRef idx="3">
-            <a:schemeClr val="lt1"/>
-          </a:lnRef>
-          <a:fillRef idx="1">
-            <a:schemeClr val="accent2"/>
-          </a:fillRef>
-          <a:effectRef idx="1">
-            <a:schemeClr val="accent2"/>
-          </a:effectRef>
-          <a:fontRef idx="minor">
-            <a:schemeClr val="lt1"/>
-          </a:fontRef>
-        </p:style>
-        <p:txBody>
-          <a:bodyPr rtlCol="0" anchor="ctr"/>
-          <a:lstStyle/>
-          <a:p>
-            <a:pPr algn="ctr"/>
-            <a:r>
-              <a:rPr lang="fr-FR" sz="1000" dirty="0" smtClean="0"/>
-              <a:t>Editer</a:t>
-            </a:r>
-            <a:endParaRPr lang="fr-FR" sz="1000" dirty="0"/>
-          </a:p>
-        </p:txBody>
-      </p:sp>
-      <p:sp>
-        <p:nvSpPr>
-          <p:cNvPr id="23" name="Rectangle 22"/>
-          <p:cNvSpPr/>
-          <p:nvPr/>
-        </p:nvSpPr>
-        <p:spPr>
-          <a:xfrm>
-            <a:off x="6531724" y="5213319"/>
-            <a:ext cx="743989" cy="138837"/>
+          <a:lnRef idx="2">
+            <a:schemeClr val="accent1">
+              <a:shade val="50000"/>
+            </a:schemeClr>
+          </a:lnRef>
+          <a:fillRef idx="1">
+            <a:schemeClr val="accent1"/>
+          </a:fillRef>
+          <a:effectRef idx="0">
+            <a:schemeClr val="accent1"/>
+          </a:effectRef>
+          <a:fontRef idx="minor">
+            <a:schemeClr val="lt1"/>
+          </a:fontRef>
+        </p:style>
+        <p:txBody>
+          <a:bodyPr rtlCol="0" anchor="ctr"/>
+          <a:lstStyle/>
+          <a:p>
+            <a:pPr algn="ctr"/>
+            <a:r>
+              <a:rPr lang="fr-FR" sz="1000" dirty="0" smtClean="0">
+                <a:solidFill>
+                  <a:schemeClr val="tx1"/>
+                </a:solidFill>
+              </a:rPr>
+              <a:t>Signaler</a:t>
+            </a:r>
+            <a:endParaRPr lang="fr-FR" sz="1000" dirty="0">
+              <a:solidFill>
+                <a:schemeClr val="tx1"/>
+              </a:solidFill>
+            </a:endParaRPr>
+          </a:p>
+        </p:txBody>
+      </p:sp>
+      <p:sp>
+        <p:nvSpPr>
+          <p:cNvPr id="19" name="Rectangle 18"/>
+          <p:cNvSpPr/>
+          <p:nvPr/>
+        </p:nvSpPr>
+        <p:spPr>
+          <a:xfrm>
+            <a:off x="4015047" y="5201847"/>
+            <a:ext cx="631768" cy="161782"/>
           </a:xfrm>
           <a:prstGeom prst="rect">
             <a:avLst/>
           </a:prstGeom>
           <a:solidFill>
-            <a:srgbClr val="FF0000"/>
+            <a:schemeClr val="accent4"/>
           </a:solidFill>
         </p:spPr>
         <p:style>
-          <a:lnRef idx="3">
-            <a:schemeClr val="lt1"/>
-          </a:lnRef>
-          <a:fillRef idx="1">
-            <a:schemeClr val="accent2"/>
-          </a:fillRef>
-          <a:effectRef idx="1">
-            <a:schemeClr val="accent2"/>
-          </a:effectRef>
-          <a:fontRef idx="minor">
-            <a:schemeClr val="lt1"/>
-          </a:fontRef>
-        </p:style>
-        <p:txBody>
-          <a:bodyPr rtlCol="0" anchor="ctr"/>
-          <a:lstStyle/>
-          <a:p>
-            <a:pPr algn="ctr"/>
-            <a:r>
-              <a:rPr lang="fr-FR" sz="1000" dirty="0" smtClean="0"/>
-              <a:t>Editer</a:t>
-            </a:r>
-            <a:endParaRPr lang="fr-FR" sz="1000" dirty="0"/>
-          </a:p>
-        </p:txBody>
-      </p:sp>
-      <p:sp>
-        <p:nvSpPr>
-          <p:cNvPr id="24" name="Rectangle 23"/>
-          <p:cNvSpPr/>
-          <p:nvPr/>
-        </p:nvSpPr>
-        <p:spPr>
-          <a:xfrm>
-            <a:off x="6531723" y="5764802"/>
-            <a:ext cx="743989" cy="138837"/>
+          <a:lnRef idx="2">
+            <a:schemeClr val="accent1">
+              <a:shade val="50000"/>
+            </a:schemeClr>
+          </a:lnRef>
+          <a:fillRef idx="1">
+            <a:schemeClr val="accent1"/>
+          </a:fillRef>
+          <a:effectRef idx="0">
+            <a:schemeClr val="accent1"/>
+          </a:effectRef>
+          <a:fontRef idx="minor">
+            <a:schemeClr val="lt1"/>
+          </a:fontRef>
+        </p:style>
+        <p:txBody>
+          <a:bodyPr rtlCol="0" anchor="ctr"/>
+          <a:lstStyle/>
+          <a:p>
+            <a:pPr algn="ctr"/>
+            <a:r>
+              <a:rPr lang="fr-FR" sz="1000" dirty="0" smtClean="0">
+                <a:solidFill>
+                  <a:schemeClr val="tx1"/>
+                </a:solidFill>
+              </a:rPr>
+              <a:t>Signaler</a:t>
+            </a:r>
+            <a:endParaRPr lang="fr-FR" sz="1000" dirty="0">
+              <a:solidFill>
+                <a:schemeClr val="tx1"/>
+              </a:solidFill>
+            </a:endParaRPr>
+          </a:p>
+        </p:txBody>
+      </p:sp>
+      <p:sp>
+        <p:nvSpPr>
+          <p:cNvPr id="20" name="Rectangle 19"/>
+          <p:cNvSpPr/>
+          <p:nvPr/>
+        </p:nvSpPr>
+        <p:spPr>
+          <a:xfrm>
+            <a:off x="4015047" y="5741857"/>
+            <a:ext cx="631768" cy="161782"/>
           </a:xfrm>
           <a:prstGeom prst="rect">
             <a:avLst/>
           </a:prstGeom>
           <a:solidFill>
-            <a:srgbClr val="FF0000"/>
+            <a:schemeClr val="accent4"/>
           </a:solidFill>
         </p:spPr>
         <p:style>
-          <a:lnRef idx="3">
-            <a:schemeClr val="lt1"/>
-          </a:lnRef>
-          <a:fillRef idx="1">
-            <a:schemeClr val="accent2"/>
-          </a:fillRef>
-          <a:effectRef idx="1">
-            <a:schemeClr val="accent2"/>
-          </a:effectRef>
-          <a:fontRef idx="minor">
-            <a:schemeClr val="lt1"/>
-          </a:fontRef>
-        </p:style>
-        <p:txBody>
-          <a:bodyPr rtlCol="0" anchor="ctr"/>
-          <a:lstStyle/>
-          <a:p>
-            <a:pPr algn="ctr"/>
-            <a:r>
-              <a:rPr lang="fr-FR" sz="1000" dirty="0" smtClean="0"/>
-              <a:t>Editer</a:t>
-            </a:r>
-            <a:endParaRPr lang="fr-FR" sz="1000" dirty="0"/>
-          </a:p>
-        </p:txBody>
-      </p:sp>
-      <p:sp>
-        <p:nvSpPr>
-          <p:cNvPr id="25" name="Rectangle 24"/>
-          <p:cNvSpPr/>
-          <p:nvPr/>
-        </p:nvSpPr>
-        <p:spPr>
-          <a:xfrm>
-            <a:off x="6531722" y="6352481"/>
-            <a:ext cx="743989" cy="138837"/>
+          <a:lnRef idx="2">
+            <a:schemeClr val="accent1">
+              <a:shade val="50000"/>
+            </a:schemeClr>
+          </a:lnRef>
+          <a:fillRef idx="1">
+            <a:schemeClr val="accent1"/>
+          </a:fillRef>
+          <a:effectRef idx="0">
+            <a:schemeClr val="accent1"/>
+          </a:effectRef>
+          <a:fontRef idx="minor">
+            <a:schemeClr val="lt1"/>
+          </a:fontRef>
+        </p:style>
+        <p:txBody>
+          <a:bodyPr rtlCol="0" anchor="ctr"/>
+          <a:lstStyle/>
+          <a:p>
+            <a:pPr algn="ctr"/>
+            <a:r>
+              <a:rPr lang="fr-FR" sz="1000" dirty="0" smtClean="0">
+                <a:solidFill>
+                  <a:schemeClr val="tx1"/>
+                </a:solidFill>
+              </a:rPr>
+              <a:t>Signaler</a:t>
+            </a:r>
+            <a:endParaRPr lang="fr-FR" sz="1000" dirty="0">
+              <a:solidFill>
+                <a:schemeClr val="tx1"/>
+              </a:solidFill>
+            </a:endParaRPr>
+          </a:p>
+        </p:txBody>
+      </p:sp>
+      <p:sp>
+        <p:nvSpPr>
+          <p:cNvPr id="21" name="Rectangle 20"/>
+          <p:cNvSpPr/>
+          <p:nvPr/>
+        </p:nvSpPr>
+        <p:spPr>
+          <a:xfrm>
+            <a:off x="4015047" y="6325183"/>
+            <a:ext cx="631768" cy="161782"/>
           </a:xfrm>
           <a:prstGeom prst="rect">
             <a:avLst/>
           </a:prstGeom>
           <a:solidFill>
-            <a:srgbClr val="FF0000"/>
+            <a:schemeClr val="accent4"/>
           </a:solidFill>
         </p:spPr>
         <p:style>
-          <a:lnRef idx="3">
-            <a:schemeClr val="lt1"/>
-          </a:lnRef>
-          <a:fillRef idx="1">
-            <a:schemeClr val="accent2"/>
-          </a:fillRef>
-          <a:effectRef idx="1">
-            <a:schemeClr val="accent2"/>
-          </a:effectRef>
-          <a:fontRef idx="minor">
-            <a:schemeClr val="lt1"/>
-          </a:fontRef>
-        </p:style>
-        <p:txBody>
-          <a:bodyPr rtlCol="0" anchor="ctr"/>
-          <a:lstStyle/>
-          <a:p>
-            <a:pPr algn="ctr"/>
-            <a:r>
-              <a:rPr lang="fr-FR" sz="1000" dirty="0" smtClean="0"/>
-              <a:t>Editer</a:t>
-            </a:r>
-            <a:endParaRPr lang="fr-FR" sz="1000" dirty="0"/>
-          </a:p>
-        </p:txBody>
-      </p:sp>
-      <p:sp>
-        <p:nvSpPr>
-          <p:cNvPr id="26" name="Multiplication 25"/>
-          <p:cNvSpPr/>
-          <p:nvPr/>
-        </p:nvSpPr>
-        <p:spPr>
-          <a:xfrm>
-            <a:off x="7341177" y="4519214"/>
-            <a:ext cx="253538" cy="245196"/>
-          </a:xfrm>
-          <a:prstGeom prst="mathMultiply">
-            <a:avLst/>
-          </a:prstGeom>
-          <a:solidFill>
-            <a:srgbClr val="FF0000"/>
-          </a:solidFill>
-        </p:spPr>
-        <p:style>
-          <a:lnRef idx="2">
-            <a:schemeClr val="accent1">
-              <a:shade val="50000"/>
-            </a:schemeClr>
-          </a:lnRef>
-          <a:fillRef idx="1">
-            <a:schemeClr val="accent1"/>
-          </a:fillRef>
-          <a:effectRef idx="0">
-            <a:schemeClr val="accent1"/>
-          </a:effectRef>
-          <a:fontRef idx="minor">
-            <a:schemeClr val="lt1"/>
-          </a:fontRef>
-        </p:style>
-        <p:txBody>
-          <a:bodyPr rtlCol="0" anchor="ctr"/>
-          <a:lstStyle/>
-          <a:p>
-            <a:pPr algn="ctr"/>
-            <a:endParaRPr lang="fr-FR"/>
-          </a:p>
-        </p:txBody>
-      </p:sp>
-      <p:sp>
-        <p:nvSpPr>
-          <p:cNvPr id="27" name="Multiplication 26"/>
-          <p:cNvSpPr/>
-          <p:nvPr/>
-        </p:nvSpPr>
-        <p:spPr>
-          <a:xfrm>
-            <a:off x="7346375" y="5079249"/>
-            <a:ext cx="253538" cy="245196"/>
-          </a:xfrm>
-          <a:prstGeom prst="mathMultiply">
-            <a:avLst/>
-          </a:prstGeom>
-          <a:solidFill>
-            <a:srgbClr val="FF0000"/>
-          </a:solidFill>
-        </p:spPr>
-        <p:style>
-          <a:lnRef idx="2">
-            <a:schemeClr val="accent1">
-              <a:shade val="50000"/>
-            </a:schemeClr>
-          </a:lnRef>
-          <a:fillRef idx="1">
-            <a:schemeClr val="accent1"/>
-          </a:fillRef>
-          <a:effectRef idx="0">
-            <a:schemeClr val="accent1"/>
-          </a:effectRef>
-          <a:fontRef idx="minor">
-            <a:schemeClr val="lt1"/>
-          </a:fontRef>
-        </p:style>
-        <p:txBody>
-          <a:bodyPr rtlCol="0" anchor="ctr"/>
-          <a:lstStyle/>
-          <a:p>
-            <a:pPr algn="ctr"/>
-            <a:endParaRPr lang="fr-FR"/>
-          </a:p>
-        </p:txBody>
-      </p:sp>
-      <p:sp>
-        <p:nvSpPr>
-          <p:cNvPr id="28" name="Multiplication 27"/>
-          <p:cNvSpPr/>
-          <p:nvPr/>
-        </p:nvSpPr>
-        <p:spPr>
-          <a:xfrm>
-            <a:off x="7329742" y="5625366"/>
-            <a:ext cx="253538" cy="245196"/>
-          </a:xfrm>
-          <a:prstGeom prst="mathMultiply">
-            <a:avLst/>
-          </a:prstGeom>
-          <a:solidFill>
-            <a:srgbClr val="FF0000"/>
-          </a:solidFill>
-        </p:spPr>
-        <p:style>
-          <a:lnRef idx="2">
-            <a:schemeClr val="accent1">
-              <a:shade val="50000"/>
-            </a:schemeClr>
-          </a:lnRef>
-          <a:fillRef idx="1">
-            <a:schemeClr val="accent1"/>
-          </a:fillRef>
-          <a:effectRef idx="0">
-            <a:schemeClr val="accent1"/>
-          </a:effectRef>
-          <a:fontRef idx="minor">
-            <a:schemeClr val="lt1"/>
-          </a:fontRef>
-        </p:style>
-        <p:txBody>
-          <a:bodyPr rtlCol="0" anchor="ctr"/>
-          <a:lstStyle/>
-          <a:p>
-            <a:pPr algn="ctr"/>
-            <a:endParaRPr lang="fr-FR"/>
-          </a:p>
-        </p:txBody>
-      </p:sp>
-      <p:sp>
-        <p:nvSpPr>
-          <p:cNvPr id="29" name="Multiplication 28"/>
-          <p:cNvSpPr/>
-          <p:nvPr/>
-        </p:nvSpPr>
-        <p:spPr>
-          <a:xfrm>
-            <a:off x="7325592" y="6200062"/>
-            <a:ext cx="253538" cy="245196"/>
-          </a:xfrm>
-          <a:prstGeom prst="mathMultiply">
-            <a:avLst/>
-          </a:prstGeom>
-          <a:solidFill>
-            <a:srgbClr val="FF0000"/>
-          </a:solidFill>
-        </p:spPr>
-        <p:style>
-          <a:lnRef idx="2">
-            <a:schemeClr val="accent1">
-              <a:shade val="50000"/>
-            </a:schemeClr>
-          </a:lnRef>
-          <a:fillRef idx="1">
-            <a:schemeClr val="accent1"/>
-          </a:fillRef>
-          <a:effectRef idx="0">
-            <a:schemeClr val="accent1"/>
-          </a:effectRef>
-          <a:fontRef idx="minor">
-            <a:schemeClr val="lt1"/>
-          </a:fontRef>
-        </p:style>
-        <p:txBody>
-          <a:bodyPr rtlCol="0" anchor="ctr"/>
-          <a:lstStyle/>
-          <a:p>
-            <a:pPr algn="ctr"/>
-            <a:endParaRPr lang="fr-FR"/>
-          </a:p>
-        </p:txBody>
-      </p:sp>
-      <p:sp>
-        <p:nvSpPr>
-          <p:cNvPr id="30" name="Rectangle 29"/>
-          <p:cNvSpPr/>
-          <p:nvPr/>
-        </p:nvSpPr>
-        <p:spPr>
-          <a:xfrm>
-            <a:off x="3915294" y="3860945"/>
-            <a:ext cx="3740727" cy="432262"/>
-          </a:xfrm>
-          <a:prstGeom prst="rect">
-            <a:avLst/>
-          </a:prstGeom>
-        </p:spPr>
-        <p:style>
-          <a:lnRef idx="2">
-            <a:schemeClr val="accent1">
-              <a:shade val="50000"/>
-            </a:schemeClr>
-          </a:lnRef>
-          <a:fillRef idx="1">
-            <a:schemeClr val="accent1"/>
-          </a:fillRef>
-          <a:effectRef idx="0">
-            <a:schemeClr val="accent1"/>
-          </a:effectRef>
-          <a:fontRef idx="minor">
-            <a:schemeClr val="lt1"/>
-          </a:fontRef>
-        </p:style>
-        <p:txBody>
-          <a:bodyPr rtlCol="0" anchor="ctr"/>
-          <a:lstStyle/>
-          <a:p>
-            <a:pPr algn="ctr"/>
-            <a:r>
-              <a:rPr lang="fr-FR" dirty="0" smtClean="0"/>
-              <a:t>Commentaire</a:t>
-            </a:r>
-            <a:endParaRPr lang="fr-FR" dirty="0"/>
-          </a:p>
-        </p:txBody>
-      </p:sp>
-      <p:sp>
-        <p:nvSpPr>
-          <p:cNvPr id="31" name="Multiplication 30"/>
-          <p:cNvSpPr/>
-          <p:nvPr/>
-        </p:nvSpPr>
-        <p:spPr>
-          <a:xfrm>
-            <a:off x="7341177" y="3966131"/>
-            <a:ext cx="253538" cy="245196"/>
-          </a:xfrm>
-          <a:prstGeom prst="mathMultiply">
-            <a:avLst/>
-          </a:prstGeom>
-          <a:solidFill>
-            <a:srgbClr val="FF0000"/>
-          </a:solidFill>
-        </p:spPr>
-        <p:style>
-          <a:lnRef idx="2">
-            <a:schemeClr val="accent1">
-              <a:shade val="50000"/>
-            </a:schemeClr>
-          </a:lnRef>
-          <a:fillRef idx="1">
-            <a:schemeClr val="accent1"/>
-          </a:fillRef>
-          <a:effectRef idx="0">
-            <a:schemeClr val="accent1"/>
-          </a:effectRef>
-          <a:fontRef idx="minor">
-            <a:schemeClr val="lt1"/>
-          </a:fontRef>
-        </p:style>
-        <p:txBody>
-          <a:bodyPr rtlCol="0" anchor="ctr"/>
-          <a:lstStyle/>
-          <a:p>
-            <a:pPr algn="ctr"/>
-            <a:endParaRPr lang="fr-FR"/>
-          </a:p>
-        </p:txBody>
-      </p:sp>
-      <p:sp>
-        <p:nvSpPr>
-          <p:cNvPr id="33" name="Rectangle 32"/>
-          <p:cNvSpPr/>
-          <p:nvPr/>
-        </p:nvSpPr>
-        <p:spPr>
-          <a:xfrm>
-            <a:off x="6531722" y="4123841"/>
-            <a:ext cx="743989" cy="138837"/>
-          </a:xfrm>
-          <a:prstGeom prst="rect">
-            <a:avLst/>
-          </a:prstGeom>
-          <a:solidFill>
-            <a:srgbClr val="FF0000"/>
-          </a:solidFill>
-        </p:spPr>
-        <p:style>
-          <a:lnRef idx="3">
-            <a:schemeClr val="lt1"/>
-          </a:lnRef>
-          <a:fillRef idx="1">
-            <a:schemeClr val="accent2"/>
-          </a:fillRef>
-          <a:effectRef idx="1">
-            <a:schemeClr val="accent2"/>
-          </a:effectRef>
-          <a:fontRef idx="minor">
-            <a:schemeClr val="lt1"/>
-          </a:fontRef>
-        </p:style>
-        <p:txBody>
-          <a:bodyPr rtlCol="0" anchor="ctr"/>
-          <a:lstStyle/>
-          <a:p>
-            <a:pPr algn="ctr"/>
-            <a:r>
-              <a:rPr lang="fr-FR" sz="1000" dirty="0" smtClean="0"/>
-              <a:t>Editer</a:t>
-            </a:r>
-            <a:endParaRPr lang="fr-FR" sz="1000" dirty="0"/>
+          <a:lnRef idx="2">
+            <a:schemeClr val="accent1">
+              <a:shade val="50000"/>
+            </a:schemeClr>
+          </a:lnRef>
+          <a:fillRef idx="1">
+            <a:schemeClr val="accent1"/>
+          </a:fillRef>
+          <a:effectRef idx="0">
+            <a:schemeClr val="accent1"/>
+          </a:effectRef>
+          <a:fontRef idx="minor">
+            <a:schemeClr val="lt1"/>
+          </a:fontRef>
+        </p:style>
+        <p:txBody>
+          <a:bodyPr rtlCol="0" anchor="ctr"/>
+          <a:lstStyle/>
+          <a:p>
+            <a:pPr algn="ctr"/>
+            <a:r>
+              <a:rPr lang="fr-FR" sz="1000" dirty="0" smtClean="0">
+                <a:solidFill>
+                  <a:schemeClr val="tx1"/>
+                </a:solidFill>
+              </a:rPr>
+              <a:t>Signaler</a:t>
+            </a:r>
+            <a:endParaRPr lang="fr-FR" sz="1000" dirty="0">
+              <a:solidFill>
+                <a:schemeClr val="tx1"/>
+              </a:solidFill>
+            </a:endParaRPr>
           </a:p>
         </p:txBody>
       </p:sp>
     </p:spTree>
     <p:extLst>
       <p:ext uri="{BB962C8B-B14F-4D97-AF65-F5344CB8AC3E}">
-        <p14:creationId xmlns:p14="http://schemas.microsoft.com/office/powerpoint/2010/main" val="2448887525"/>
+        <p14:creationId xmlns:p14="http://schemas.microsoft.com/office/powerpoint/2010/main" val="1251785626"/>
       </p:ext>
     </p:extLst>
   </p:cSld>
@@ -7268,7 +7483,7 @@
             <a:pPr algn="ctr"/>
             <a:r>
               <a:rPr lang="fr-FR" dirty="0" smtClean="0"/>
-              <a:t>Page de création de billet</a:t>
+              <a:t>Page de lecture d’un billet par l’admin</a:t>
             </a:r>
             <a:endParaRPr lang="fr-FR" dirty="0"/>
           </a:p>
@@ -7282,8 +7497,8 @@
         </p:nvSpPr>
         <p:spPr>
           <a:xfrm>
-            <a:off x="3399905" y="1454727"/>
-            <a:ext cx="5012575" cy="5270269"/>
+            <a:off x="3291840" y="1396538"/>
+            <a:ext cx="4871258" cy="5403273"/>
           </a:xfrm>
           <a:prstGeom prst="rect">
             <a:avLst/>
@@ -7322,8 +7537,8 @@
         </p:nvSpPr>
         <p:spPr>
           <a:xfrm>
-            <a:off x="3757353" y="2286000"/>
-            <a:ext cx="4272742" cy="2527069"/>
+            <a:off x="3749040" y="1978429"/>
+            <a:ext cx="4015047" cy="1446415"/>
           </a:xfrm>
           <a:prstGeom prst="rect">
             <a:avLst/>
@@ -7355,11 +7570,7 @@
             <a:pPr algn="ctr"/>
             <a:r>
               <a:rPr lang="fr-FR" dirty="0" smtClean="0"/>
-              <a:t>Editeur de texte </a:t>
-            </a:r>
-            <a:r>
-              <a:rPr lang="fr-FR" dirty="0" err="1" smtClean="0"/>
-              <a:t>TinyMCE</a:t>
+              <a:t>Billet</a:t>
             </a:r>
             <a:endParaRPr lang="fr-FR" dirty="0"/>
           </a:p>
@@ -7373,8 +7584,8 @@
         </p:nvSpPr>
         <p:spPr>
           <a:xfrm>
-            <a:off x="6724997" y="4962698"/>
-            <a:ext cx="1296786" cy="382386"/>
+            <a:off x="3798916" y="3757353"/>
+            <a:ext cx="3956859" cy="2934392"/>
           </a:xfrm>
           <a:prstGeom prst="rect">
             <a:avLst/>
@@ -7404,65 +7615,674 @@
           <a:lstStyle/>
           <a:p>
             <a:pPr algn="ctr"/>
-            <a:r>
-              <a:rPr lang="fr-FR" sz="1400" dirty="0" smtClean="0"/>
-              <a:t>Poster</a:t>
-            </a:r>
-            <a:endParaRPr lang="fr-FR" sz="1400" dirty="0"/>
-          </a:p>
-        </p:txBody>
-      </p:sp>
-      <p:sp>
-        <p:nvSpPr>
-          <p:cNvPr id="6" name="Rectangle 5"/>
-          <p:cNvSpPr/>
-          <p:nvPr/>
-        </p:nvSpPr>
-        <p:spPr>
-          <a:xfrm>
-            <a:off x="3757353" y="4962698"/>
-            <a:ext cx="1246909" cy="382386"/>
+            <a:endParaRPr lang="fr-FR"/>
+          </a:p>
+        </p:txBody>
+      </p:sp>
+      <p:sp>
+        <p:nvSpPr>
+          <p:cNvPr id="8" name="Rectangle 7"/>
+          <p:cNvSpPr/>
+          <p:nvPr/>
+        </p:nvSpPr>
+        <p:spPr>
+          <a:xfrm>
+            <a:off x="3915295" y="4409585"/>
+            <a:ext cx="3740727" cy="432262"/>
+          </a:xfrm>
+          <a:prstGeom prst="rect">
+            <a:avLst/>
+          </a:prstGeom>
+        </p:spPr>
+        <p:style>
+          <a:lnRef idx="2">
+            <a:schemeClr val="accent1">
+              <a:shade val="50000"/>
+            </a:schemeClr>
+          </a:lnRef>
+          <a:fillRef idx="1">
+            <a:schemeClr val="accent1"/>
+          </a:fillRef>
+          <a:effectRef idx="0">
+            <a:schemeClr val="accent1"/>
+          </a:effectRef>
+          <a:fontRef idx="minor">
+            <a:schemeClr val="lt1"/>
+          </a:fontRef>
+        </p:style>
+        <p:txBody>
+          <a:bodyPr rtlCol="0" anchor="ctr"/>
+          <a:lstStyle/>
+          <a:p>
+            <a:pPr algn="ctr"/>
+            <a:r>
+              <a:rPr lang="fr-FR" dirty="0" smtClean="0"/>
+              <a:t>Commentaire</a:t>
+            </a:r>
+            <a:endParaRPr lang="fr-FR" dirty="0"/>
+          </a:p>
+        </p:txBody>
+      </p:sp>
+      <p:sp>
+        <p:nvSpPr>
+          <p:cNvPr id="9" name="Rectangle 8"/>
+          <p:cNvSpPr/>
+          <p:nvPr/>
+        </p:nvSpPr>
+        <p:spPr>
+          <a:xfrm>
+            <a:off x="3915295" y="4958225"/>
+            <a:ext cx="3740727" cy="432262"/>
+          </a:xfrm>
+          <a:prstGeom prst="rect">
+            <a:avLst/>
+          </a:prstGeom>
+        </p:spPr>
+        <p:style>
+          <a:lnRef idx="2">
+            <a:schemeClr val="accent1">
+              <a:shade val="50000"/>
+            </a:schemeClr>
+          </a:lnRef>
+          <a:fillRef idx="1">
+            <a:schemeClr val="accent1"/>
+          </a:fillRef>
+          <a:effectRef idx="0">
+            <a:schemeClr val="accent1"/>
+          </a:effectRef>
+          <a:fontRef idx="minor">
+            <a:schemeClr val="lt1"/>
+          </a:fontRef>
+        </p:style>
+        <p:txBody>
+          <a:bodyPr rtlCol="0" anchor="ctr"/>
+          <a:lstStyle/>
+          <a:p>
+            <a:pPr algn="ctr"/>
+            <a:r>
+              <a:rPr lang="fr-FR" smtClean="0"/>
+              <a:t>Commentaire</a:t>
+            </a:r>
+            <a:endParaRPr lang="fr-FR" dirty="0"/>
+          </a:p>
+        </p:txBody>
+      </p:sp>
+      <p:sp>
+        <p:nvSpPr>
+          <p:cNvPr id="10" name="Rectangle 9"/>
+          <p:cNvSpPr/>
+          <p:nvPr/>
+        </p:nvSpPr>
+        <p:spPr>
+          <a:xfrm>
+            <a:off x="3915295" y="5506865"/>
+            <a:ext cx="3740727" cy="432262"/>
+          </a:xfrm>
+          <a:prstGeom prst="rect">
+            <a:avLst/>
+          </a:prstGeom>
+        </p:spPr>
+        <p:style>
+          <a:lnRef idx="2">
+            <a:schemeClr val="accent1">
+              <a:shade val="50000"/>
+            </a:schemeClr>
+          </a:lnRef>
+          <a:fillRef idx="1">
+            <a:schemeClr val="accent1"/>
+          </a:fillRef>
+          <a:effectRef idx="0">
+            <a:schemeClr val="accent1"/>
+          </a:effectRef>
+          <a:fontRef idx="minor">
+            <a:schemeClr val="lt1"/>
+          </a:fontRef>
+        </p:style>
+        <p:txBody>
+          <a:bodyPr rtlCol="0" anchor="ctr"/>
+          <a:lstStyle/>
+          <a:p>
+            <a:pPr algn="ctr"/>
+            <a:r>
+              <a:rPr lang="fr-FR" smtClean="0"/>
+              <a:t>Commentaire</a:t>
+            </a:r>
+            <a:endParaRPr lang="fr-FR" dirty="0"/>
+          </a:p>
+        </p:txBody>
+      </p:sp>
+      <p:sp>
+        <p:nvSpPr>
+          <p:cNvPr id="11" name="Rectangle 10"/>
+          <p:cNvSpPr/>
+          <p:nvPr/>
+        </p:nvSpPr>
+        <p:spPr>
+          <a:xfrm>
+            <a:off x="3915295" y="6081561"/>
+            <a:ext cx="3740727" cy="432262"/>
+          </a:xfrm>
+          <a:prstGeom prst="rect">
+            <a:avLst/>
+          </a:prstGeom>
+        </p:spPr>
+        <p:style>
+          <a:lnRef idx="2">
+            <a:schemeClr val="accent1">
+              <a:shade val="50000"/>
+            </a:schemeClr>
+          </a:lnRef>
+          <a:fillRef idx="1">
+            <a:schemeClr val="accent1"/>
+          </a:fillRef>
+          <a:effectRef idx="0">
+            <a:schemeClr val="accent1"/>
+          </a:effectRef>
+          <a:fontRef idx="minor">
+            <a:schemeClr val="lt1"/>
+          </a:fontRef>
+        </p:style>
+        <p:txBody>
+          <a:bodyPr rtlCol="0" anchor="ctr"/>
+          <a:lstStyle/>
+          <a:p>
+            <a:pPr algn="ctr"/>
+            <a:r>
+              <a:rPr lang="fr-FR" smtClean="0"/>
+              <a:t>Commentaire</a:t>
+            </a:r>
+            <a:endParaRPr lang="fr-FR" dirty="0"/>
+          </a:p>
+        </p:txBody>
+      </p:sp>
+      <p:sp>
+        <p:nvSpPr>
+          <p:cNvPr id="22" name="Rectangle 21"/>
+          <p:cNvSpPr/>
+          <p:nvPr/>
+        </p:nvSpPr>
+        <p:spPr>
+          <a:xfrm>
+            <a:off x="6531725" y="4683723"/>
+            <a:ext cx="743989" cy="138837"/>
           </a:xfrm>
           <a:prstGeom prst="rect">
             <a:avLst/>
           </a:prstGeom>
           <a:solidFill>
+            <a:srgbClr val="FF0000"/>
+          </a:solidFill>
+        </p:spPr>
+        <p:style>
+          <a:lnRef idx="3">
+            <a:schemeClr val="lt1"/>
+          </a:lnRef>
+          <a:fillRef idx="1">
             <a:schemeClr val="accent2"/>
+          </a:fillRef>
+          <a:effectRef idx="1">
+            <a:schemeClr val="accent2"/>
+          </a:effectRef>
+          <a:fontRef idx="minor">
+            <a:schemeClr val="lt1"/>
+          </a:fontRef>
+        </p:style>
+        <p:txBody>
+          <a:bodyPr rtlCol="0" anchor="ctr"/>
+          <a:lstStyle/>
+          <a:p>
+            <a:pPr algn="ctr"/>
+            <a:r>
+              <a:rPr lang="fr-FR" sz="1000" dirty="0" smtClean="0"/>
+              <a:t>Editer</a:t>
+            </a:r>
+            <a:endParaRPr lang="fr-FR" sz="1000" dirty="0"/>
+          </a:p>
+        </p:txBody>
+      </p:sp>
+      <p:sp>
+        <p:nvSpPr>
+          <p:cNvPr id="23" name="Rectangle 22"/>
+          <p:cNvSpPr/>
+          <p:nvPr/>
+        </p:nvSpPr>
+        <p:spPr>
+          <a:xfrm>
+            <a:off x="6531724" y="5213319"/>
+            <a:ext cx="743989" cy="138837"/>
+          </a:xfrm>
+          <a:prstGeom prst="rect">
+            <a:avLst/>
+          </a:prstGeom>
+          <a:solidFill>
+            <a:srgbClr val="FF0000"/>
           </a:solidFill>
         </p:spPr>
         <p:style>
-          <a:lnRef idx="2">
-            <a:schemeClr val="accent1">
-              <a:shade val="50000"/>
-            </a:schemeClr>
-          </a:lnRef>
-          <a:fillRef idx="1">
-            <a:schemeClr val="accent1"/>
-          </a:fillRef>
-          <a:effectRef idx="0">
-            <a:schemeClr val="accent1"/>
-          </a:effectRef>
-          <a:fontRef idx="minor">
-            <a:schemeClr val="lt1"/>
-          </a:fontRef>
-        </p:style>
-        <p:txBody>
-          <a:bodyPr rtlCol="0" anchor="ctr"/>
-          <a:lstStyle/>
-          <a:p>
-            <a:pPr algn="ctr"/>
-            <a:r>
-              <a:rPr lang="fr-FR" sz="1400" dirty="0" smtClean="0"/>
-              <a:t>Sauvegarder</a:t>
-            </a:r>
-            <a:endParaRPr lang="fr-FR" sz="1400" dirty="0"/>
+          <a:lnRef idx="3">
+            <a:schemeClr val="lt1"/>
+          </a:lnRef>
+          <a:fillRef idx="1">
+            <a:schemeClr val="accent2"/>
+          </a:fillRef>
+          <a:effectRef idx="1">
+            <a:schemeClr val="accent2"/>
+          </a:effectRef>
+          <a:fontRef idx="minor">
+            <a:schemeClr val="lt1"/>
+          </a:fontRef>
+        </p:style>
+        <p:txBody>
+          <a:bodyPr rtlCol="0" anchor="ctr"/>
+          <a:lstStyle/>
+          <a:p>
+            <a:pPr algn="ctr"/>
+            <a:r>
+              <a:rPr lang="fr-FR" sz="1000" dirty="0" smtClean="0"/>
+              <a:t>Editer</a:t>
+            </a:r>
+            <a:endParaRPr lang="fr-FR" sz="1000" dirty="0"/>
+          </a:p>
+        </p:txBody>
+      </p:sp>
+      <p:sp>
+        <p:nvSpPr>
+          <p:cNvPr id="24" name="Rectangle 23"/>
+          <p:cNvSpPr/>
+          <p:nvPr/>
+        </p:nvSpPr>
+        <p:spPr>
+          <a:xfrm>
+            <a:off x="6531723" y="5764802"/>
+            <a:ext cx="743989" cy="138837"/>
+          </a:xfrm>
+          <a:prstGeom prst="rect">
+            <a:avLst/>
+          </a:prstGeom>
+          <a:solidFill>
+            <a:srgbClr val="FF0000"/>
+          </a:solidFill>
+        </p:spPr>
+        <p:style>
+          <a:lnRef idx="3">
+            <a:schemeClr val="lt1"/>
+          </a:lnRef>
+          <a:fillRef idx="1">
+            <a:schemeClr val="accent2"/>
+          </a:fillRef>
+          <a:effectRef idx="1">
+            <a:schemeClr val="accent2"/>
+          </a:effectRef>
+          <a:fontRef idx="minor">
+            <a:schemeClr val="lt1"/>
+          </a:fontRef>
+        </p:style>
+        <p:txBody>
+          <a:bodyPr rtlCol="0" anchor="ctr"/>
+          <a:lstStyle/>
+          <a:p>
+            <a:pPr algn="ctr"/>
+            <a:r>
+              <a:rPr lang="fr-FR" sz="1000" dirty="0" smtClean="0"/>
+              <a:t>Editer</a:t>
+            </a:r>
+            <a:endParaRPr lang="fr-FR" sz="1000" dirty="0"/>
+          </a:p>
+        </p:txBody>
+      </p:sp>
+      <p:sp>
+        <p:nvSpPr>
+          <p:cNvPr id="25" name="Rectangle 24"/>
+          <p:cNvSpPr/>
+          <p:nvPr/>
+        </p:nvSpPr>
+        <p:spPr>
+          <a:xfrm>
+            <a:off x="6531722" y="6352481"/>
+            <a:ext cx="743989" cy="138837"/>
+          </a:xfrm>
+          <a:prstGeom prst="rect">
+            <a:avLst/>
+          </a:prstGeom>
+          <a:solidFill>
+            <a:srgbClr val="FF0000"/>
+          </a:solidFill>
+        </p:spPr>
+        <p:style>
+          <a:lnRef idx="3">
+            <a:schemeClr val="lt1"/>
+          </a:lnRef>
+          <a:fillRef idx="1">
+            <a:schemeClr val="accent2"/>
+          </a:fillRef>
+          <a:effectRef idx="1">
+            <a:schemeClr val="accent2"/>
+          </a:effectRef>
+          <a:fontRef idx="minor">
+            <a:schemeClr val="lt1"/>
+          </a:fontRef>
+        </p:style>
+        <p:txBody>
+          <a:bodyPr rtlCol="0" anchor="ctr"/>
+          <a:lstStyle/>
+          <a:p>
+            <a:pPr algn="ctr"/>
+            <a:r>
+              <a:rPr lang="fr-FR" sz="1000" dirty="0" smtClean="0"/>
+              <a:t>Editer</a:t>
+            </a:r>
+            <a:endParaRPr lang="fr-FR" sz="1000" dirty="0"/>
+          </a:p>
+        </p:txBody>
+      </p:sp>
+      <p:sp>
+        <p:nvSpPr>
+          <p:cNvPr id="26" name="Multiplication 25"/>
+          <p:cNvSpPr/>
+          <p:nvPr/>
+        </p:nvSpPr>
+        <p:spPr>
+          <a:xfrm>
+            <a:off x="7341177" y="4519214"/>
+            <a:ext cx="253538" cy="245196"/>
+          </a:xfrm>
+          <a:prstGeom prst="mathMultiply">
+            <a:avLst/>
+          </a:prstGeom>
+          <a:solidFill>
+            <a:srgbClr val="FF0000"/>
+          </a:solidFill>
+        </p:spPr>
+        <p:style>
+          <a:lnRef idx="2">
+            <a:schemeClr val="accent1">
+              <a:shade val="50000"/>
+            </a:schemeClr>
+          </a:lnRef>
+          <a:fillRef idx="1">
+            <a:schemeClr val="accent1"/>
+          </a:fillRef>
+          <a:effectRef idx="0">
+            <a:schemeClr val="accent1"/>
+          </a:effectRef>
+          <a:fontRef idx="minor">
+            <a:schemeClr val="lt1"/>
+          </a:fontRef>
+        </p:style>
+        <p:txBody>
+          <a:bodyPr rtlCol="0" anchor="ctr"/>
+          <a:lstStyle/>
+          <a:p>
+            <a:pPr algn="ctr"/>
+            <a:endParaRPr lang="fr-FR"/>
+          </a:p>
+        </p:txBody>
+      </p:sp>
+      <p:sp>
+        <p:nvSpPr>
+          <p:cNvPr id="27" name="Multiplication 26"/>
+          <p:cNvSpPr/>
+          <p:nvPr/>
+        </p:nvSpPr>
+        <p:spPr>
+          <a:xfrm>
+            <a:off x="7346375" y="5079249"/>
+            <a:ext cx="253538" cy="245196"/>
+          </a:xfrm>
+          <a:prstGeom prst="mathMultiply">
+            <a:avLst/>
+          </a:prstGeom>
+          <a:solidFill>
+            <a:srgbClr val="FF0000"/>
+          </a:solidFill>
+        </p:spPr>
+        <p:style>
+          <a:lnRef idx="2">
+            <a:schemeClr val="accent1">
+              <a:shade val="50000"/>
+            </a:schemeClr>
+          </a:lnRef>
+          <a:fillRef idx="1">
+            <a:schemeClr val="accent1"/>
+          </a:fillRef>
+          <a:effectRef idx="0">
+            <a:schemeClr val="accent1"/>
+          </a:effectRef>
+          <a:fontRef idx="minor">
+            <a:schemeClr val="lt1"/>
+          </a:fontRef>
+        </p:style>
+        <p:txBody>
+          <a:bodyPr rtlCol="0" anchor="ctr"/>
+          <a:lstStyle/>
+          <a:p>
+            <a:pPr algn="ctr"/>
+            <a:endParaRPr lang="fr-FR"/>
+          </a:p>
+        </p:txBody>
+      </p:sp>
+      <p:sp>
+        <p:nvSpPr>
+          <p:cNvPr id="28" name="Multiplication 27"/>
+          <p:cNvSpPr/>
+          <p:nvPr/>
+        </p:nvSpPr>
+        <p:spPr>
+          <a:xfrm>
+            <a:off x="7329742" y="5625366"/>
+            <a:ext cx="253538" cy="245196"/>
+          </a:xfrm>
+          <a:prstGeom prst="mathMultiply">
+            <a:avLst/>
+          </a:prstGeom>
+          <a:solidFill>
+            <a:srgbClr val="FF0000"/>
+          </a:solidFill>
+        </p:spPr>
+        <p:style>
+          <a:lnRef idx="2">
+            <a:schemeClr val="accent1">
+              <a:shade val="50000"/>
+            </a:schemeClr>
+          </a:lnRef>
+          <a:fillRef idx="1">
+            <a:schemeClr val="accent1"/>
+          </a:fillRef>
+          <a:effectRef idx="0">
+            <a:schemeClr val="accent1"/>
+          </a:effectRef>
+          <a:fontRef idx="minor">
+            <a:schemeClr val="lt1"/>
+          </a:fontRef>
+        </p:style>
+        <p:txBody>
+          <a:bodyPr rtlCol="0" anchor="ctr"/>
+          <a:lstStyle/>
+          <a:p>
+            <a:pPr algn="ctr"/>
+            <a:endParaRPr lang="fr-FR"/>
+          </a:p>
+        </p:txBody>
+      </p:sp>
+      <p:sp>
+        <p:nvSpPr>
+          <p:cNvPr id="29" name="Multiplication 28"/>
+          <p:cNvSpPr/>
+          <p:nvPr/>
+        </p:nvSpPr>
+        <p:spPr>
+          <a:xfrm>
+            <a:off x="7325592" y="6200062"/>
+            <a:ext cx="253538" cy="245196"/>
+          </a:xfrm>
+          <a:prstGeom prst="mathMultiply">
+            <a:avLst/>
+          </a:prstGeom>
+          <a:solidFill>
+            <a:srgbClr val="FF0000"/>
+          </a:solidFill>
+        </p:spPr>
+        <p:style>
+          <a:lnRef idx="2">
+            <a:schemeClr val="accent1">
+              <a:shade val="50000"/>
+            </a:schemeClr>
+          </a:lnRef>
+          <a:fillRef idx="1">
+            <a:schemeClr val="accent1"/>
+          </a:fillRef>
+          <a:effectRef idx="0">
+            <a:schemeClr val="accent1"/>
+          </a:effectRef>
+          <a:fontRef idx="minor">
+            <a:schemeClr val="lt1"/>
+          </a:fontRef>
+        </p:style>
+        <p:txBody>
+          <a:bodyPr rtlCol="0" anchor="ctr"/>
+          <a:lstStyle/>
+          <a:p>
+            <a:pPr algn="ctr"/>
+            <a:endParaRPr lang="fr-FR"/>
+          </a:p>
+        </p:txBody>
+      </p:sp>
+      <p:sp>
+        <p:nvSpPr>
+          <p:cNvPr id="30" name="Rectangle 29"/>
+          <p:cNvSpPr/>
+          <p:nvPr/>
+        </p:nvSpPr>
+        <p:spPr>
+          <a:xfrm>
+            <a:off x="3915294" y="3860945"/>
+            <a:ext cx="3740727" cy="432262"/>
+          </a:xfrm>
+          <a:prstGeom prst="rect">
+            <a:avLst/>
+          </a:prstGeom>
+        </p:spPr>
+        <p:style>
+          <a:lnRef idx="2">
+            <a:schemeClr val="accent1">
+              <a:shade val="50000"/>
+            </a:schemeClr>
+          </a:lnRef>
+          <a:fillRef idx="1">
+            <a:schemeClr val="accent1"/>
+          </a:fillRef>
+          <a:effectRef idx="0">
+            <a:schemeClr val="accent1"/>
+          </a:effectRef>
+          <a:fontRef idx="minor">
+            <a:schemeClr val="lt1"/>
+          </a:fontRef>
+        </p:style>
+        <p:txBody>
+          <a:bodyPr rtlCol="0" anchor="ctr"/>
+          <a:lstStyle/>
+          <a:p>
+            <a:pPr algn="ctr"/>
+            <a:r>
+              <a:rPr lang="fr-FR" dirty="0" smtClean="0"/>
+              <a:t>Commentaire</a:t>
+            </a:r>
+            <a:endParaRPr lang="fr-FR" dirty="0"/>
+          </a:p>
+        </p:txBody>
+      </p:sp>
+      <p:sp>
+        <p:nvSpPr>
+          <p:cNvPr id="31" name="Multiplication 30"/>
+          <p:cNvSpPr/>
+          <p:nvPr/>
+        </p:nvSpPr>
+        <p:spPr>
+          <a:xfrm>
+            <a:off x="7341177" y="3966131"/>
+            <a:ext cx="253538" cy="245196"/>
+          </a:xfrm>
+          <a:prstGeom prst="mathMultiply">
+            <a:avLst/>
+          </a:prstGeom>
+          <a:solidFill>
+            <a:srgbClr val="FF0000"/>
+          </a:solidFill>
+        </p:spPr>
+        <p:style>
+          <a:lnRef idx="2">
+            <a:schemeClr val="accent1">
+              <a:shade val="50000"/>
+            </a:schemeClr>
+          </a:lnRef>
+          <a:fillRef idx="1">
+            <a:schemeClr val="accent1"/>
+          </a:fillRef>
+          <a:effectRef idx="0">
+            <a:schemeClr val="accent1"/>
+          </a:effectRef>
+          <a:fontRef idx="minor">
+            <a:schemeClr val="lt1"/>
+          </a:fontRef>
+        </p:style>
+        <p:txBody>
+          <a:bodyPr rtlCol="0" anchor="ctr"/>
+          <a:lstStyle/>
+          <a:p>
+            <a:pPr algn="ctr"/>
+            <a:endParaRPr lang="fr-FR"/>
+          </a:p>
+        </p:txBody>
+      </p:sp>
+      <p:sp>
+        <p:nvSpPr>
+          <p:cNvPr id="33" name="Rectangle 32"/>
+          <p:cNvSpPr/>
+          <p:nvPr/>
+        </p:nvSpPr>
+        <p:spPr>
+          <a:xfrm>
+            <a:off x="6531722" y="4123841"/>
+            <a:ext cx="743989" cy="138837"/>
+          </a:xfrm>
+          <a:prstGeom prst="rect">
+            <a:avLst/>
+          </a:prstGeom>
+          <a:solidFill>
+            <a:srgbClr val="FF0000"/>
+          </a:solidFill>
+        </p:spPr>
+        <p:style>
+          <a:lnRef idx="3">
+            <a:schemeClr val="lt1"/>
+          </a:lnRef>
+          <a:fillRef idx="1">
+            <a:schemeClr val="accent2"/>
+          </a:fillRef>
+          <a:effectRef idx="1">
+            <a:schemeClr val="accent2"/>
+          </a:effectRef>
+          <a:fontRef idx="minor">
+            <a:schemeClr val="lt1"/>
+          </a:fontRef>
+        </p:style>
+        <p:txBody>
+          <a:bodyPr rtlCol="0" anchor="ctr"/>
+          <a:lstStyle/>
+          <a:p>
+            <a:pPr algn="ctr"/>
+            <a:r>
+              <a:rPr lang="fr-FR" sz="1000" dirty="0" smtClean="0"/>
+              <a:t>Editer</a:t>
+            </a:r>
+            <a:endParaRPr lang="fr-FR" sz="1000" dirty="0"/>
           </a:p>
         </p:txBody>
       </p:sp>
     </p:spTree>
     <p:extLst>
       <p:ext uri="{BB962C8B-B14F-4D97-AF65-F5344CB8AC3E}">
-        <p14:creationId xmlns:p14="http://schemas.microsoft.com/office/powerpoint/2010/main" val="2229166928"/>
+        <p14:creationId xmlns:p14="http://schemas.microsoft.com/office/powerpoint/2010/main" val="2448887525"/>
       </p:ext>
     </p:extLst>
   </p:cSld>
@@ -7514,7 +8334,7 @@
             <a:pPr algn="ctr"/>
             <a:r>
               <a:rPr lang="fr-FR" dirty="0" smtClean="0"/>
-              <a:t>Page d’édition de billet</a:t>
+              <a:t>Page de création de billet</a:t>
             </a:r>
             <a:endParaRPr lang="fr-FR" dirty="0"/>
           </a:p>
@@ -7652,7 +8472,7 @@
             <a:pPr algn="ctr"/>
             <a:r>
               <a:rPr lang="fr-FR" sz="1400" dirty="0" smtClean="0"/>
-              <a:t>Archiver</a:t>
+              <a:t>Poster</a:t>
             </a:r>
             <a:endParaRPr lang="fr-FR" sz="1400" dirty="0"/>
           </a:p>
@@ -7660,14 +8480,14 @@
       </p:sp>
       <p:sp>
         <p:nvSpPr>
-          <p:cNvPr id="7" name="Rectangle 6"/>
-          <p:cNvSpPr/>
-          <p:nvPr/>
-        </p:nvSpPr>
-        <p:spPr>
-          <a:xfrm>
-            <a:off x="3757353" y="4992744"/>
-            <a:ext cx="1213658" cy="382386"/>
+          <p:cNvPr id="6" name="Rectangle 5"/>
+          <p:cNvSpPr/>
+          <p:nvPr/>
+        </p:nvSpPr>
+        <p:spPr>
+          <a:xfrm>
+            <a:off x="3757353" y="4962698"/>
+            <a:ext cx="1246909" cy="382386"/>
           </a:xfrm>
           <a:prstGeom prst="rect">
             <a:avLst/>
@@ -7699,7 +8519,7 @@
             <a:pPr algn="ctr"/>
             <a:r>
               <a:rPr lang="fr-FR" sz="1400" dirty="0" smtClean="0"/>
-              <a:t>Mettre à jour</a:t>
+              <a:t>Sauvegarder</a:t>
             </a:r>
             <a:endParaRPr lang="fr-FR" sz="1400" dirty="0"/>
           </a:p>
@@ -7708,7 +8528,7 @@
     </p:spTree>
     <p:extLst>
       <p:ext uri="{BB962C8B-B14F-4D97-AF65-F5344CB8AC3E}">
-        <p14:creationId xmlns:p14="http://schemas.microsoft.com/office/powerpoint/2010/main" val="524222635"/>
+        <p14:creationId xmlns:p14="http://schemas.microsoft.com/office/powerpoint/2010/main" val="2229166928"/>
       </p:ext>
     </p:extLst>
   </p:cSld>
@@ -7760,11 +8580,7 @@
             <a:pPr algn="ctr"/>
             <a:r>
               <a:rPr lang="fr-FR" dirty="0" smtClean="0"/>
-              <a:t>Page de </a:t>
-            </a:r>
-            <a:r>
-              <a:rPr lang="fr-FR" dirty="0" smtClean="0"/>
-              <a:t>connexion</a:t>
+              <a:t>Page d’édition de billet</a:t>
             </a:r>
             <a:endParaRPr lang="fr-FR" dirty="0"/>
           </a:p>
@@ -7778,35 +8594,35 @@
         </p:nvSpPr>
         <p:spPr>
           <a:xfrm>
-            <a:off x="3308465" y="1463041"/>
-            <a:ext cx="5278582" cy="5278582"/>
-          </a:xfrm>
-          <a:prstGeom prst="rect">
-            <a:avLst/>
-          </a:prstGeom>
-        </p:spPr>
-        <p:style>
-          <a:lnRef idx="2">
-            <a:schemeClr val="accent1">
-              <a:shade val="50000"/>
-            </a:schemeClr>
-          </a:lnRef>
-          <a:fillRef idx="1">
-            <a:schemeClr val="accent1"/>
-          </a:fillRef>
-          <a:effectRef idx="0">
-            <a:schemeClr val="accent1"/>
-          </a:effectRef>
-          <a:fontRef idx="minor">
-            <a:schemeClr val="lt1"/>
-          </a:fontRef>
-        </p:style>
-        <p:txBody>
-          <a:bodyPr rtlCol="0" anchor="ctr"/>
-          <a:lstStyle/>
-          <a:p>
-            <a:pPr algn="ctr"/>
-            <a:endParaRPr lang="fr-FR" sz="1400" dirty="0"/>
+            <a:off x="3399905" y="1454727"/>
+            <a:ext cx="5012575" cy="5270269"/>
+          </a:xfrm>
+          <a:prstGeom prst="rect">
+            <a:avLst/>
+          </a:prstGeom>
+        </p:spPr>
+        <p:style>
+          <a:lnRef idx="2">
+            <a:schemeClr val="accent1">
+              <a:shade val="50000"/>
+            </a:schemeClr>
+          </a:lnRef>
+          <a:fillRef idx="1">
+            <a:schemeClr val="accent1"/>
+          </a:fillRef>
+          <a:effectRef idx="0">
+            <a:schemeClr val="accent1"/>
+          </a:effectRef>
+          <a:fontRef idx="minor">
+            <a:schemeClr val="lt1"/>
+          </a:fontRef>
+        </p:style>
+        <p:txBody>
+          <a:bodyPr rtlCol="0" anchor="ctr"/>
+          <a:lstStyle/>
+          <a:p>
+            <a:pPr algn="ctr"/>
+            <a:endParaRPr lang="fr-FR"/>
           </a:p>
         </p:txBody>
       </p:sp>
@@ -7818,8 +8634,8 @@
         </p:nvSpPr>
         <p:spPr>
           <a:xfrm>
-            <a:off x="3649287" y="2901142"/>
-            <a:ext cx="1986742" cy="365761"/>
+            <a:off x="3757353" y="2286000"/>
+            <a:ext cx="4272742" cy="2527069"/>
           </a:xfrm>
           <a:prstGeom prst="rect">
             <a:avLst/>
@@ -7850,10 +8666,14 @@
           <a:p>
             <a:pPr algn="ctr"/>
             <a:r>
-              <a:rPr lang="fr-FR" sz="1400" dirty="0" smtClean="0"/>
-              <a:t>Adresse mail</a:t>
-            </a:r>
-            <a:endParaRPr lang="fr-FR" sz="1400" dirty="0"/>
+              <a:rPr lang="fr-FR" dirty="0" smtClean="0"/>
+              <a:t>Editeur de texte </a:t>
+            </a:r>
+            <a:r>
+              <a:rPr lang="fr-FR" dirty="0" err="1" smtClean="0"/>
+              <a:t>TinyMCE</a:t>
+            </a:r>
+            <a:endParaRPr lang="fr-FR" dirty="0"/>
           </a:p>
         </p:txBody>
       </p:sp>
@@ -7865,8 +8685,8 @@
         </p:nvSpPr>
         <p:spPr>
           <a:xfrm>
-            <a:off x="3649287" y="3528435"/>
-            <a:ext cx="1986742" cy="378547"/>
+            <a:off x="6724997" y="4962698"/>
+            <a:ext cx="1296786" cy="382386"/>
           </a:xfrm>
           <a:prstGeom prst="rect">
             <a:avLst/>
@@ -7898,7 +8718,7 @@
             <a:pPr algn="ctr"/>
             <a:r>
               <a:rPr lang="fr-FR" sz="1400" dirty="0" smtClean="0"/>
-              <a:t>Mot de passe</a:t>
+              <a:t>Archiver</a:t>
             </a:r>
             <a:endParaRPr lang="fr-FR" sz="1400" dirty="0"/>
           </a:p>
@@ -7906,193 +8726,14 @@
       </p:sp>
       <p:sp>
         <p:nvSpPr>
-          <p:cNvPr id="6" name="Rectangle 5"/>
-          <p:cNvSpPr/>
-          <p:nvPr/>
-        </p:nvSpPr>
-        <p:spPr>
-          <a:xfrm>
-            <a:off x="3649287" y="4268584"/>
-            <a:ext cx="1986742" cy="365760"/>
-          </a:xfrm>
-          <a:prstGeom prst="rect">
-            <a:avLst/>
-          </a:prstGeom>
-          <a:solidFill>
-            <a:schemeClr val="accent6"/>
-          </a:solidFill>
-        </p:spPr>
-        <p:style>
-          <a:lnRef idx="2">
-            <a:schemeClr val="accent1">
-              <a:shade val="50000"/>
-            </a:schemeClr>
-          </a:lnRef>
-          <a:fillRef idx="1">
-            <a:schemeClr val="accent1"/>
-          </a:fillRef>
-          <a:effectRef idx="0">
-            <a:schemeClr val="accent1"/>
-          </a:effectRef>
-          <a:fontRef idx="minor">
-            <a:schemeClr val="lt1"/>
-          </a:fontRef>
-        </p:style>
-        <p:txBody>
-          <a:bodyPr rtlCol="0" anchor="ctr"/>
-          <a:lstStyle/>
-          <a:p>
-            <a:pPr algn="ctr"/>
-            <a:r>
-              <a:rPr lang="fr-FR" sz="1200" dirty="0" smtClean="0"/>
-              <a:t>Connexion</a:t>
-            </a:r>
-            <a:endParaRPr lang="fr-FR" sz="1200" dirty="0"/>
-          </a:p>
-        </p:txBody>
-      </p:sp>
-      <p:sp>
-        <p:nvSpPr>
           <p:cNvPr id="7" name="Rectangle 6"/>
           <p:cNvSpPr/>
           <p:nvPr/>
         </p:nvSpPr>
         <p:spPr>
           <a:xfrm>
-            <a:off x="4305993" y="3950622"/>
-            <a:ext cx="1330036" cy="114301"/>
-          </a:xfrm>
-          <a:prstGeom prst="rect">
-            <a:avLst/>
-          </a:prstGeom>
-          <a:solidFill>
-            <a:schemeClr val="tx2">
-              <a:lumMod val="60000"/>
-              <a:lumOff val="40000"/>
-            </a:schemeClr>
-          </a:solidFill>
-        </p:spPr>
-        <p:style>
-          <a:lnRef idx="2">
-            <a:schemeClr val="accent1">
-              <a:shade val="50000"/>
-            </a:schemeClr>
-          </a:lnRef>
-          <a:fillRef idx="1">
-            <a:schemeClr val="accent1"/>
-          </a:fillRef>
-          <a:effectRef idx="0">
-            <a:schemeClr val="accent1"/>
-          </a:effectRef>
-          <a:fontRef idx="minor">
-            <a:schemeClr val="lt1"/>
-          </a:fontRef>
-        </p:style>
-        <p:txBody>
-          <a:bodyPr rtlCol="0" anchor="ctr"/>
-          <a:lstStyle/>
-          <a:p>
-            <a:pPr algn="ctr"/>
-            <a:r>
-              <a:rPr lang="fr-FR" sz="1000" dirty="0" smtClean="0"/>
-              <a:t>Mot de passe oublié ?</a:t>
-            </a:r>
-            <a:endParaRPr lang="fr-FR" sz="1000" dirty="0"/>
-          </a:p>
-        </p:txBody>
-      </p:sp>
-      <p:sp>
-        <p:nvSpPr>
-          <p:cNvPr id="9" name="Rectangle 8"/>
-          <p:cNvSpPr/>
-          <p:nvPr/>
-        </p:nvSpPr>
-        <p:spPr>
-          <a:xfrm>
-            <a:off x="6380019" y="3200407"/>
-            <a:ext cx="1986743" cy="378547"/>
-          </a:xfrm>
-          <a:prstGeom prst="rect">
-            <a:avLst/>
-          </a:prstGeom>
-          <a:solidFill>
-            <a:schemeClr val="accent6"/>
-          </a:solidFill>
-        </p:spPr>
-        <p:style>
-          <a:lnRef idx="2">
-            <a:schemeClr val="accent1">
-              <a:shade val="50000"/>
-            </a:schemeClr>
-          </a:lnRef>
-          <a:fillRef idx="1">
-            <a:schemeClr val="accent1"/>
-          </a:fillRef>
-          <a:effectRef idx="0">
-            <a:schemeClr val="accent1"/>
-          </a:effectRef>
-          <a:fontRef idx="minor">
-            <a:schemeClr val="lt1"/>
-          </a:fontRef>
-        </p:style>
-        <p:txBody>
-          <a:bodyPr rtlCol="0" anchor="ctr"/>
-          <a:lstStyle/>
-          <a:p>
-            <a:pPr algn="ctr"/>
-            <a:r>
-              <a:rPr lang="fr-FR" sz="1200" dirty="0" smtClean="0"/>
-              <a:t>Créer mon compte</a:t>
-            </a:r>
-            <a:endParaRPr lang="fr-FR" sz="1200" dirty="0"/>
-          </a:p>
-        </p:txBody>
-      </p:sp>
-      <p:cxnSp>
-        <p:nvCxnSpPr>
-          <p:cNvPr id="11" name="Connecteur droit 10"/>
-          <p:cNvCxnSpPr/>
-          <p:nvPr/>
-        </p:nvCxnSpPr>
-        <p:spPr>
-          <a:xfrm>
-            <a:off x="6035040" y="2094807"/>
-            <a:ext cx="0" cy="2909455"/>
-          </a:xfrm>
-          <a:prstGeom prst="line">
-            <a:avLst/>
-          </a:prstGeom>
-          <a:ln>
-            <a:solidFill>
-              <a:schemeClr val="tx1"/>
-            </a:solidFill>
-          </a:ln>
-        </p:spPr>
-        <p:style>
-          <a:lnRef idx="1">
-            <a:schemeClr val="accent1"/>
-          </a:lnRef>
-          <a:fillRef idx="0">
-            <a:schemeClr val="accent1"/>
-          </a:fillRef>
-          <a:effectRef idx="0">
-            <a:schemeClr val="accent1"/>
-          </a:effectRef>
-          <a:fontRef idx="minor">
-            <a:schemeClr val="tx1"/>
-          </a:fontRef>
-        </p:style>
-      </p:cxnSp>
-      <p:sp>
-        <p:nvSpPr>
-          <p:cNvPr id="14" name="Rectangle 13"/>
-          <p:cNvSpPr/>
-          <p:nvPr/>
-        </p:nvSpPr>
-        <p:spPr>
-          <a:xfrm>
-            <a:off x="3649288" y="2220782"/>
-            <a:ext cx="1986742" cy="365761"/>
+            <a:off x="3757353" y="4992744"/>
+            <a:ext cx="1213658" cy="382386"/>
           </a:xfrm>
           <a:prstGeom prst="rect">
             <a:avLst/>
@@ -8124,54 +8765,7 @@
             <a:pPr algn="ctr"/>
             <a:r>
               <a:rPr lang="fr-FR" sz="1400" dirty="0" smtClean="0"/>
-              <a:t>Déjà inscrit ?</a:t>
-            </a:r>
-            <a:endParaRPr lang="fr-FR" sz="1400" dirty="0"/>
-          </a:p>
-        </p:txBody>
-      </p:sp>
-      <p:sp>
-        <p:nvSpPr>
-          <p:cNvPr id="15" name="Rectangle 14"/>
-          <p:cNvSpPr/>
-          <p:nvPr/>
-        </p:nvSpPr>
-        <p:spPr>
-          <a:xfrm>
-            <a:off x="6380019" y="2220782"/>
-            <a:ext cx="1986742" cy="365761"/>
-          </a:xfrm>
-          <a:prstGeom prst="rect">
-            <a:avLst/>
-          </a:prstGeom>
-          <a:solidFill>
-            <a:schemeClr val="accent2"/>
-          </a:solidFill>
-        </p:spPr>
-        <p:style>
-          <a:lnRef idx="2">
-            <a:schemeClr val="accent1">
-              <a:shade val="50000"/>
-            </a:schemeClr>
-          </a:lnRef>
-          <a:fillRef idx="1">
-            <a:schemeClr val="accent1"/>
-          </a:fillRef>
-          <a:effectRef idx="0">
-            <a:schemeClr val="accent1"/>
-          </a:effectRef>
-          <a:fontRef idx="minor">
-            <a:schemeClr val="lt1"/>
-          </a:fontRef>
-        </p:style>
-        <p:txBody>
-          <a:bodyPr rtlCol="0" anchor="ctr"/>
-          <a:lstStyle/>
-          <a:p>
-            <a:pPr algn="ctr"/>
-            <a:r>
-              <a:rPr lang="fr-FR" sz="1400" dirty="0" smtClean="0"/>
-              <a:t>Nouveau visiteur ?</a:t>
+              <a:t>Mettre à jour</a:t>
             </a:r>
             <a:endParaRPr lang="fr-FR" sz="1400" dirty="0"/>
           </a:p>
@@ -8180,7 +8774,7 @@
     </p:spTree>
     <p:extLst>
       <p:ext uri="{BB962C8B-B14F-4D97-AF65-F5344CB8AC3E}">
-        <p14:creationId xmlns:p14="http://schemas.microsoft.com/office/powerpoint/2010/main" val="4030212898"/>
+        <p14:creationId xmlns:p14="http://schemas.microsoft.com/office/powerpoint/2010/main" val="524222635"/>
       </p:ext>
     </p:extLst>
   </p:cSld>
@@ -8216,7 +8810,7 @@
       </p:grpSpPr>
       <p:sp>
         <p:nvSpPr>
-          <p:cNvPr id="4" name="Titre 3"/>
+          <p:cNvPr id="2" name="Titre 1"/>
           <p:cNvSpPr>
             <a:spLocks noGrp="1"/>
           </p:cNvSpPr>
@@ -8231,8 +8825,8 @@
           <a:p>
             <a:pPr algn="ctr"/>
             <a:r>
-              <a:rPr lang="fr-FR" dirty="0"/>
-              <a:t>Page d’accueil admin</a:t>
+              <a:rPr lang="fr-FR" dirty="0" smtClean="0"/>
+              <a:t>Page de connexion</a:t>
             </a:r>
             <a:endParaRPr lang="fr-FR" dirty="0"/>
           </a:p>
@@ -8240,54 +8834,54 @@
       </p:sp>
       <p:sp>
         <p:nvSpPr>
-          <p:cNvPr id="9" name="Rectangle 8"/>
-          <p:cNvSpPr/>
-          <p:nvPr/>
-        </p:nvSpPr>
-        <p:spPr>
-          <a:xfrm>
-            <a:off x="3241963" y="1321724"/>
-            <a:ext cx="5378335" cy="5364914"/>
-          </a:xfrm>
-          <a:prstGeom prst="rect">
-            <a:avLst/>
-          </a:prstGeom>
-        </p:spPr>
-        <p:style>
-          <a:lnRef idx="2">
-            <a:schemeClr val="accent1">
-              <a:shade val="50000"/>
-            </a:schemeClr>
-          </a:lnRef>
-          <a:fillRef idx="1">
-            <a:schemeClr val="accent1"/>
-          </a:fillRef>
-          <a:effectRef idx="0">
-            <a:schemeClr val="accent1"/>
-          </a:effectRef>
-          <a:fontRef idx="minor">
-            <a:schemeClr val="lt1"/>
-          </a:fontRef>
-        </p:style>
-        <p:txBody>
-          <a:bodyPr rtlCol="0" anchor="ctr"/>
-          <a:lstStyle/>
-          <a:p>
-            <a:pPr algn="ctr"/>
-            <a:endParaRPr lang="fr-FR"/>
-          </a:p>
-        </p:txBody>
-      </p:sp>
-      <p:sp>
-        <p:nvSpPr>
-          <p:cNvPr id="10" name="Rectangle 9"/>
-          <p:cNvSpPr/>
-          <p:nvPr/>
-        </p:nvSpPr>
-        <p:spPr>
-          <a:xfrm>
-            <a:off x="4397432" y="1487978"/>
-            <a:ext cx="2951018" cy="640080"/>
+          <p:cNvPr id="3" name="Rectangle 2"/>
+          <p:cNvSpPr/>
+          <p:nvPr/>
+        </p:nvSpPr>
+        <p:spPr>
+          <a:xfrm>
+            <a:off x="3308465" y="1463041"/>
+            <a:ext cx="5278582" cy="5278582"/>
+          </a:xfrm>
+          <a:prstGeom prst="rect">
+            <a:avLst/>
+          </a:prstGeom>
+        </p:spPr>
+        <p:style>
+          <a:lnRef idx="2">
+            <a:schemeClr val="accent1">
+              <a:shade val="50000"/>
+            </a:schemeClr>
+          </a:lnRef>
+          <a:fillRef idx="1">
+            <a:schemeClr val="accent1"/>
+          </a:fillRef>
+          <a:effectRef idx="0">
+            <a:schemeClr val="accent1"/>
+          </a:effectRef>
+          <a:fontRef idx="minor">
+            <a:schemeClr val="lt1"/>
+          </a:fontRef>
+        </p:style>
+        <p:txBody>
+          <a:bodyPr rtlCol="0" anchor="ctr"/>
+          <a:lstStyle/>
+          <a:p>
+            <a:pPr algn="ctr"/>
+            <a:endParaRPr lang="fr-FR" sz="1400" dirty="0"/>
+          </a:p>
+        </p:txBody>
+      </p:sp>
+      <p:sp>
+        <p:nvSpPr>
+          <p:cNvPr id="4" name="Rectangle 3"/>
+          <p:cNvSpPr/>
+          <p:nvPr/>
+        </p:nvSpPr>
+        <p:spPr>
+          <a:xfrm>
+            <a:off x="3649287" y="2901142"/>
+            <a:ext cx="1986742" cy="365761"/>
           </a:xfrm>
           <a:prstGeom prst="rect">
             <a:avLst/>
@@ -8318,23 +8912,23 @@
           <a:p>
             <a:pPr algn="ctr"/>
             <a:r>
-              <a:rPr lang="fr-FR" dirty="0" smtClean="0"/>
-              <a:t>Titre</a:t>
-            </a:r>
-            <a:endParaRPr lang="fr-FR" dirty="0"/>
-          </a:p>
-        </p:txBody>
-      </p:sp>
-      <p:sp>
-        <p:nvSpPr>
-          <p:cNvPr id="11" name="Rectangle 10"/>
-          <p:cNvSpPr/>
-          <p:nvPr/>
-        </p:nvSpPr>
-        <p:spPr>
-          <a:xfrm>
-            <a:off x="7506393" y="1487978"/>
-            <a:ext cx="997525" cy="432261"/>
+              <a:rPr lang="fr-FR" sz="1400" dirty="0" smtClean="0"/>
+              <a:t>Adresse mail</a:t>
+            </a:r>
+            <a:endParaRPr lang="fr-FR" sz="1400" dirty="0"/>
+          </a:p>
+        </p:txBody>
+      </p:sp>
+      <p:sp>
+        <p:nvSpPr>
+          <p:cNvPr id="5" name="Rectangle 4"/>
+          <p:cNvSpPr/>
+          <p:nvPr/>
+        </p:nvSpPr>
+        <p:spPr>
+          <a:xfrm>
+            <a:off x="3649287" y="3528435"/>
+            <a:ext cx="1986742" cy="378547"/>
           </a:xfrm>
           <a:prstGeom prst="rect">
             <a:avLst/>
@@ -8365,8 +8959,55 @@
           <a:p>
             <a:pPr algn="ctr"/>
             <a:r>
+              <a:rPr lang="fr-FR" sz="1400" dirty="0" smtClean="0"/>
+              <a:t>Mot de passe</a:t>
+            </a:r>
+            <a:endParaRPr lang="fr-FR" sz="1400" dirty="0"/>
+          </a:p>
+        </p:txBody>
+      </p:sp>
+      <p:sp>
+        <p:nvSpPr>
+          <p:cNvPr id="6" name="Rectangle 5"/>
+          <p:cNvSpPr/>
+          <p:nvPr/>
+        </p:nvSpPr>
+        <p:spPr>
+          <a:xfrm>
+            <a:off x="3649287" y="4268584"/>
+            <a:ext cx="1986742" cy="365760"/>
+          </a:xfrm>
+          <a:prstGeom prst="rect">
+            <a:avLst/>
+          </a:prstGeom>
+          <a:solidFill>
+            <a:schemeClr val="accent6"/>
+          </a:solidFill>
+        </p:spPr>
+        <p:style>
+          <a:lnRef idx="2">
+            <a:schemeClr val="accent1">
+              <a:shade val="50000"/>
+            </a:schemeClr>
+          </a:lnRef>
+          <a:fillRef idx="1">
+            <a:schemeClr val="accent1"/>
+          </a:fillRef>
+          <a:effectRef idx="0">
+            <a:schemeClr val="accent1"/>
+          </a:effectRef>
+          <a:fontRef idx="minor">
+            <a:schemeClr val="lt1"/>
+          </a:fontRef>
+        </p:style>
+        <p:txBody>
+          <a:bodyPr rtlCol="0" anchor="ctr"/>
+          <a:lstStyle/>
+          <a:p>
+            <a:pPr algn="ctr"/>
+            <a:r>
               <a:rPr lang="fr-FR" sz="1200" dirty="0" smtClean="0"/>
-              <a:t>Déconnexion</a:t>
+              <a:t>Connexion</a:t>
             </a:r>
             <a:endParaRPr lang="fr-FR" sz="1200" dirty="0"/>
           </a:p>
@@ -8374,14 +9015,146 @@
       </p:sp>
       <p:sp>
         <p:nvSpPr>
-          <p:cNvPr id="12" name="Rectangle 11"/>
-          <p:cNvSpPr/>
-          <p:nvPr/>
-        </p:nvSpPr>
-        <p:spPr>
-          <a:xfrm>
-            <a:off x="3740728" y="2644416"/>
-            <a:ext cx="2668386" cy="3285432"/>
+          <p:cNvPr id="7" name="Rectangle 6"/>
+          <p:cNvSpPr/>
+          <p:nvPr/>
+        </p:nvSpPr>
+        <p:spPr>
+          <a:xfrm>
+            <a:off x="4305993" y="3950622"/>
+            <a:ext cx="1330036" cy="114301"/>
+          </a:xfrm>
+          <a:prstGeom prst="rect">
+            <a:avLst/>
+          </a:prstGeom>
+          <a:solidFill>
+            <a:schemeClr val="tx2">
+              <a:lumMod val="60000"/>
+              <a:lumOff val="40000"/>
+            </a:schemeClr>
+          </a:solidFill>
+        </p:spPr>
+        <p:style>
+          <a:lnRef idx="2">
+            <a:schemeClr val="accent1">
+              <a:shade val="50000"/>
+            </a:schemeClr>
+          </a:lnRef>
+          <a:fillRef idx="1">
+            <a:schemeClr val="accent1"/>
+          </a:fillRef>
+          <a:effectRef idx="0">
+            <a:schemeClr val="accent1"/>
+          </a:effectRef>
+          <a:fontRef idx="minor">
+            <a:schemeClr val="lt1"/>
+          </a:fontRef>
+        </p:style>
+        <p:txBody>
+          <a:bodyPr rtlCol="0" anchor="ctr"/>
+          <a:lstStyle/>
+          <a:p>
+            <a:pPr algn="ctr"/>
+            <a:r>
+              <a:rPr lang="fr-FR" sz="1000" dirty="0" smtClean="0"/>
+              <a:t>Mot de passe oublié ?</a:t>
+            </a:r>
+            <a:endParaRPr lang="fr-FR" sz="1000" dirty="0"/>
+          </a:p>
+        </p:txBody>
+      </p:sp>
+      <p:sp>
+        <p:nvSpPr>
+          <p:cNvPr id="9" name="Rectangle 8"/>
+          <p:cNvSpPr/>
+          <p:nvPr/>
+        </p:nvSpPr>
+        <p:spPr>
+          <a:xfrm>
+            <a:off x="6380019" y="3200407"/>
+            <a:ext cx="1986743" cy="378547"/>
+          </a:xfrm>
+          <a:prstGeom prst="rect">
+            <a:avLst/>
+          </a:prstGeom>
+          <a:solidFill>
+            <a:schemeClr val="accent6"/>
+          </a:solidFill>
+        </p:spPr>
+        <p:style>
+          <a:lnRef idx="2">
+            <a:schemeClr val="accent1">
+              <a:shade val="50000"/>
+            </a:schemeClr>
+          </a:lnRef>
+          <a:fillRef idx="1">
+            <a:schemeClr val="accent1"/>
+          </a:fillRef>
+          <a:effectRef idx="0">
+            <a:schemeClr val="accent1"/>
+          </a:effectRef>
+          <a:fontRef idx="minor">
+            <a:schemeClr val="lt1"/>
+          </a:fontRef>
+        </p:style>
+        <p:txBody>
+          <a:bodyPr rtlCol="0" anchor="ctr"/>
+          <a:lstStyle/>
+          <a:p>
+            <a:pPr algn="ctr"/>
+            <a:r>
+              <a:rPr lang="fr-FR" sz="1200" dirty="0" smtClean="0"/>
+              <a:t>Créer mon compte</a:t>
+            </a:r>
+            <a:endParaRPr lang="fr-FR" sz="1200" dirty="0"/>
+          </a:p>
+        </p:txBody>
+      </p:sp>
+      <p:cxnSp>
+        <p:nvCxnSpPr>
+          <p:cNvPr id="11" name="Connecteur droit 10"/>
+          <p:cNvCxnSpPr/>
+          <p:nvPr/>
+        </p:nvCxnSpPr>
+        <p:spPr>
+          <a:xfrm>
+            <a:off x="6035040" y="2094807"/>
+            <a:ext cx="0" cy="2909455"/>
+          </a:xfrm>
+          <a:prstGeom prst="line">
+            <a:avLst/>
+          </a:prstGeom>
+          <a:ln>
+            <a:solidFill>
+              <a:schemeClr val="tx1"/>
+            </a:solidFill>
+          </a:ln>
+        </p:spPr>
+        <p:style>
+          <a:lnRef idx="1">
+            <a:schemeClr val="accent1"/>
+          </a:lnRef>
+          <a:fillRef idx="0">
+            <a:schemeClr val="accent1"/>
+          </a:fillRef>
+          <a:effectRef idx="0">
+            <a:schemeClr val="accent1"/>
+          </a:effectRef>
+          <a:fontRef idx="minor">
+            <a:schemeClr val="tx1"/>
+          </a:fontRef>
+        </p:style>
+      </p:cxnSp>
+      <p:sp>
+        <p:nvSpPr>
+          <p:cNvPr id="14" name="Rectangle 13"/>
+          <p:cNvSpPr/>
+          <p:nvPr/>
+        </p:nvSpPr>
+        <p:spPr>
+          <a:xfrm>
+            <a:off x="3649288" y="2220782"/>
+            <a:ext cx="1986742" cy="365761"/>
           </a:xfrm>
           <a:prstGeom prst="rect">
             <a:avLst/>
@@ -8411,20 +9184,24 @@
           <a:lstStyle/>
           <a:p>
             <a:pPr algn="ctr"/>
-            <a:endParaRPr lang="fr-FR" dirty="0"/>
-          </a:p>
-        </p:txBody>
-      </p:sp>
-      <p:sp>
-        <p:nvSpPr>
-          <p:cNvPr id="13" name="Rectangle 12"/>
-          <p:cNvSpPr/>
-          <p:nvPr/>
-        </p:nvSpPr>
-        <p:spPr>
-          <a:xfrm>
-            <a:off x="3415839" y="1505087"/>
-            <a:ext cx="756458" cy="556953"/>
+            <a:r>
+              <a:rPr lang="fr-FR" sz="1400" dirty="0" smtClean="0"/>
+              <a:t>Déjà inscrit ?</a:t>
+            </a:r>
+            <a:endParaRPr lang="fr-FR" sz="1400" dirty="0"/>
+          </a:p>
+        </p:txBody>
+      </p:sp>
+      <p:sp>
+        <p:nvSpPr>
+          <p:cNvPr id="15" name="Rectangle 14"/>
+          <p:cNvSpPr/>
+          <p:nvPr/>
+        </p:nvSpPr>
+        <p:spPr>
+          <a:xfrm>
+            <a:off x="6380019" y="2220782"/>
+            <a:ext cx="1986742" cy="365761"/>
           </a:xfrm>
           <a:prstGeom prst="rect">
             <a:avLst/>
@@ -8454,190 +9231,18 @@
           <a:lstStyle/>
           <a:p>
             <a:pPr algn="ctr"/>
-            <a:endParaRPr lang="fr-FR"/>
-          </a:p>
-        </p:txBody>
-      </p:sp>
-      <p:sp>
-        <p:nvSpPr>
-          <p:cNvPr id="14" name="Rectangle 13"/>
-          <p:cNvSpPr/>
-          <p:nvPr/>
-        </p:nvSpPr>
-        <p:spPr>
-          <a:xfrm>
-            <a:off x="6716683" y="2644415"/>
-            <a:ext cx="1729390" cy="3285433"/>
-          </a:xfrm>
-          <a:prstGeom prst="rect">
-            <a:avLst/>
-          </a:prstGeom>
-          <a:solidFill>
-            <a:schemeClr val="accent2"/>
-          </a:solidFill>
-        </p:spPr>
-        <p:style>
-          <a:lnRef idx="2">
-            <a:schemeClr val="accent1">
-              <a:shade val="50000"/>
-            </a:schemeClr>
-          </a:lnRef>
-          <a:fillRef idx="1">
-            <a:schemeClr val="accent1"/>
-          </a:fillRef>
-          <a:effectRef idx="0">
-            <a:schemeClr val="accent1"/>
-          </a:effectRef>
-          <a:fontRef idx="minor">
-            <a:schemeClr val="lt1"/>
-          </a:fontRef>
-        </p:style>
-        <p:txBody>
-          <a:bodyPr rtlCol="0" anchor="ctr"/>
-          <a:lstStyle/>
-          <a:p>
-            <a:pPr algn="ctr"/>
-            <a:r>
-              <a:rPr lang="fr-FR" dirty="0" smtClean="0"/>
-              <a:t>Commentaires signalés</a:t>
-            </a:r>
-          </a:p>
-          <a:p>
-            <a:pPr algn="ctr"/>
-            <a:r>
-              <a:rPr lang="fr-FR" dirty="0" smtClean="0"/>
-              <a:t>Avec date heure et nom du post</a:t>
-            </a:r>
-            <a:endParaRPr lang="fr-FR" dirty="0"/>
-          </a:p>
-        </p:txBody>
-      </p:sp>
-      <p:sp>
-        <p:nvSpPr>
-          <p:cNvPr id="15" name="Rectangle 14"/>
-          <p:cNvSpPr/>
-          <p:nvPr/>
-        </p:nvSpPr>
-        <p:spPr>
-          <a:xfrm>
-            <a:off x="3241962" y="6192013"/>
-            <a:ext cx="5378335" cy="494625"/>
-          </a:xfrm>
-          <a:prstGeom prst="rect">
-            <a:avLst/>
-          </a:prstGeom>
-          <a:solidFill>
-            <a:schemeClr val="accent2"/>
-          </a:solidFill>
-        </p:spPr>
-        <p:style>
-          <a:lnRef idx="2">
-            <a:schemeClr val="accent1">
-              <a:shade val="50000"/>
-            </a:schemeClr>
-          </a:lnRef>
-          <a:fillRef idx="1">
-            <a:schemeClr val="accent1"/>
-          </a:fillRef>
-          <a:effectRef idx="0">
-            <a:schemeClr val="accent1"/>
-          </a:effectRef>
-          <a:fontRef idx="minor">
-            <a:schemeClr val="lt1"/>
-          </a:fontRef>
-        </p:style>
-        <p:txBody>
-          <a:bodyPr rtlCol="0" anchor="ctr"/>
-          <a:lstStyle/>
-          <a:p>
-            <a:pPr algn="ctr"/>
-            <a:r>
-              <a:rPr lang="fr-FR" dirty="0" err="1" smtClean="0"/>
-              <a:t>Footer</a:t>
-            </a:r>
-            <a:endParaRPr lang="fr-FR" dirty="0"/>
-          </a:p>
-        </p:txBody>
-      </p:sp>
-      <p:sp>
-        <p:nvSpPr>
-          <p:cNvPr id="16" name="Rectangle 15"/>
-          <p:cNvSpPr/>
-          <p:nvPr/>
-        </p:nvSpPr>
-        <p:spPr>
-          <a:xfrm>
-            <a:off x="3886199" y="5749840"/>
-            <a:ext cx="1022466" cy="180008"/>
-          </a:xfrm>
-          <a:prstGeom prst="rect">
-            <a:avLst/>
-          </a:prstGeom>
-        </p:spPr>
-        <p:style>
-          <a:lnRef idx="2">
-            <a:schemeClr val="accent1">
-              <a:shade val="50000"/>
-            </a:schemeClr>
-          </a:lnRef>
-          <a:fillRef idx="1">
-            <a:schemeClr val="accent1"/>
-          </a:fillRef>
-          <a:effectRef idx="0">
-            <a:schemeClr val="accent1"/>
-          </a:effectRef>
-          <a:fontRef idx="minor">
-            <a:schemeClr val="lt1"/>
-          </a:fontRef>
-        </p:style>
-        <p:txBody>
-          <a:bodyPr rtlCol="0" anchor="ctr"/>
-          <a:lstStyle/>
-          <a:p>
-            <a:pPr algn="ctr"/>
-            <a:r>
-              <a:rPr lang="fr-FR" sz="1100" dirty="0" smtClean="0"/>
-              <a:t>Pagination</a:t>
-            </a:r>
-            <a:endParaRPr lang="fr-FR" sz="1100" dirty="0"/>
-          </a:p>
-        </p:txBody>
-      </p:sp>
-      <p:sp>
-        <p:nvSpPr>
-          <p:cNvPr id="17" name="ZoneTexte 16"/>
-          <p:cNvSpPr txBox="1"/>
-          <p:nvPr/>
-        </p:nvSpPr>
-        <p:spPr>
-          <a:xfrm>
-            <a:off x="4048297" y="2833354"/>
-            <a:ext cx="1986743" cy="369332"/>
-          </a:xfrm>
-          <a:prstGeom prst="rect">
-            <a:avLst/>
-          </a:prstGeom>
-          <a:noFill/>
-        </p:spPr>
-        <p:txBody>
-          <a:bodyPr wrap="square" rtlCol="0">
-            <a:spAutoFit/>
-          </a:bodyPr>
-          <a:lstStyle/>
-          <a:p>
-            <a:pPr algn="ctr"/>
-            <a:r>
-              <a:rPr lang="fr-FR" dirty="0" smtClean="0"/>
-              <a:t>Index des billets</a:t>
-            </a:r>
-            <a:endParaRPr lang="fr-FR" dirty="0"/>
+            <a:r>
+              <a:rPr lang="fr-FR" sz="1400" dirty="0" smtClean="0"/>
+              <a:t>Nouveau visiteur ?</a:t>
+            </a:r>
+            <a:endParaRPr lang="fr-FR" sz="1400" dirty="0"/>
           </a:p>
         </p:txBody>
       </p:sp>
     </p:spTree>
     <p:extLst>
       <p:ext uri="{BB962C8B-B14F-4D97-AF65-F5344CB8AC3E}">
-        <p14:creationId xmlns:p14="http://schemas.microsoft.com/office/powerpoint/2010/main" val="1305794342"/>
+        <p14:creationId xmlns:p14="http://schemas.microsoft.com/office/powerpoint/2010/main" val="4030212898"/>
       </p:ext>
     </p:extLst>
   </p:cSld>

</xml_diff>